<commit_message>
Transparent background on key
Also some other stuff thrown in here but it’s not important
</commit_message>
<xml_diff>
--- a/FinalPresentation.pptx
+++ b/FinalPresentation.pptx
@@ -2,16 +2,28 @@
 <file path=ppt/presentation.xml><?xml version="1.0" encoding="utf-8"?>
 <p:presentation xmlns:a="http://schemas.openxmlformats.org/drawingml/2006/main" xmlns:r="http://schemas.openxmlformats.org/officeDocument/2006/relationships" xmlns:p="http://schemas.openxmlformats.org/presentationml/2006/main" saveSubsetFonts="1" autoCompressPictures="0">
   <p:sldMasterIdLst>
-    <p:sldMasterId id="2147483648" r:id="rId1"/>
+    <p:sldMasterId id="2147483741" r:id="rId1"/>
   </p:sldMasterIdLst>
   <p:sldIdLst>
     <p:sldId id="256" r:id="rId2"/>
-    <p:sldId id="257" r:id="rId3"/>
-    <p:sldId id="258" r:id="rId4"/>
-    <p:sldId id="259" r:id="rId5"/>
-    <p:sldId id="260" r:id="rId6"/>
-    <p:sldId id="261" r:id="rId7"/>
-    <p:sldId id="262" r:id="rId8"/>
+    <p:sldId id="263" r:id="rId3"/>
+    <p:sldId id="266" r:id="rId4"/>
+    <p:sldId id="267" r:id="rId5"/>
+    <p:sldId id="264" r:id="rId6"/>
+    <p:sldId id="268" r:id="rId7"/>
+    <p:sldId id="276" r:id="rId8"/>
+    <p:sldId id="280" r:id="rId9"/>
+    <p:sldId id="285" r:id="rId10"/>
+    <p:sldId id="277" r:id="rId11"/>
+    <p:sldId id="278" r:id="rId12"/>
+    <p:sldId id="279" r:id="rId13"/>
+    <p:sldId id="281" r:id="rId14"/>
+    <p:sldId id="282" r:id="rId15"/>
+    <p:sldId id="283" r:id="rId16"/>
+    <p:sldId id="284" r:id="rId17"/>
+    <p:sldId id="274" r:id="rId18"/>
+    <p:sldId id="273" r:id="rId19"/>
+    <p:sldId id="275" r:id="rId20"/>
   </p:sldIdLst>
   <p:sldSz cx="9144000" cy="6858000" type="screen4x3"/>
   <p:notesSz cx="6858000" cy="9144000"/>
@@ -294,7 +306,7 @@
           <a:p>
             <a:fld id="{A0D41147-8885-C046-8C0D-66CFA63AE48E}" type="datetimeFigureOut">
               <a:rPr lang="en-US" smtClean="0"/>
-              <a:t>4/10/15</a:t>
+              <a:t>4/15/15</a:t>
             </a:fld>
             <a:endParaRPr lang="en-US"/>
           </a:p>
@@ -334,18 +346,19 @@
           <a:bodyPr/>
           <a:lstStyle/>
           <a:p>
-            <a:fld id="{C374B3DF-974E-5C4A-8CEC-B44AA15C7764}" type="slidenum">
-              <a:rPr lang="en-US" smtClean="0"/>
+            <a:fld id="{6E2D2B3B-882E-40F3-A32F-6DD516915044}" type="slidenum">
+              <a:rPr lang="en-US" smtClean="0"/>
+              <a:pPr/>
               <a:t>‹#›</a:t>
             </a:fld>
-            <a:endParaRPr lang="en-US"/>
+            <a:endParaRPr lang="en-US" dirty="0"/>
           </a:p>
         </p:txBody>
       </p:sp>
     </p:spTree>
     <p:extLst>
       <p:ext uri="{BB962C8B-B14F-4D97-AF65-F5344CB8AC3E}">
-        <p14:creationId xmlns:p14="http://schemas.microsoft.com/office/powerpoint/2010/main" val="119817661"/>
+        <p14:creationId xmlns:p14="http://schemas.microsoft.com/office/powerpoint/2010/main" val="2307170138"/>
       </p:ext>
     </p:extLst>
   </p:cSld>
@@ -464,7 +477,7 @@
           <a:p>
             <a:fld id="{A0D41147-8885-C046-8C0D-66CFA63AE48E}" type="datetimeFigureOut">
               <a:rPr lang="en-US" smtClean="0"/>
-              <a:t>4/10/15</a:t>
+              <a:t>4/15/15</a:t>
             </a:fld>
             <a:endParaRPr lang="en-US"/>
           </a:p>
@@ -515,7 +528,7 @@
     </p:spTree>
     <p:extLst>
       <p:ext uri="{BB962C8B-B14F-4D97-AF65-F5344CB8AC3E}">
-        <p14:creationId xmlns:p14="http://schemas.microsoft.com/office/powerpoint/2010/main" val="1204816434"/>
+        <p14:creationId xmlns:p14="http://schemas.microsoft.com/office/powerpoint/2010/main" val="1805981504"/>
       </p:ext>
     </p:extLst>
   </p:cSld>
@@ -644,7 +657,7 @@
           <a:p>
             <a:fld id="{A0D41147-8885-C046-8C0D-66CFA63AE48E}" type="datetimeFigureOut">
               <a:rPr lang="en-US" smtClean="0"/>
-              <a:t>4/10/15</a:t>
+              <a:t>4/15/15</a:t>
             </a:fld>
             <a:endParaRPr lang="en-US"/>
           </a:p>
@@ -695,7 +708,7 @@
     </p:spTree>
     <p:extLst>
       <p:ext uri="{BB962C8B-B14F-4D97-AF65-F5344CB8AC3E}">
-        <p14:creationId xmlns:p14="http://schemas.microsoft.com/office/powerpoint/2010/main" val="3180034089"/>
+        <p14:creationId xmlns:p14="http://schemas.microsoft.com/office/powerpoint/2010/main" val="3058578495"/>
       </p:ext>
     </p:extLst>
   </p:cSld>
@@ -814,7 +827,7 @@
           <a:p>
             <a:fld id="{A0D41147-8885-C046-8C0D-66CFA63AE48E}" type="datetimeFigureOut">
               <a:rPr lang="en-US" smtClean="0"/>
-              <a:t>4/10/15</a:t>
+              <a:t>4/15/15</a:t>
             </a:fld>
             <a:endParaRPr lang="en-US"/>
           </a:p>
@@ -865,7 +878,7 @@
     </p:spTree>
     <p:extLst>
       <p:ext uri="{BB962C8B-B14F-4D97-AF65-F5344CB8AC3E}">
-        <p14:creationId xmlns:p14="http://schemas.microsoft.com/office/powerpoint/2010/main" val="651974579"/>
+        <p14:creationId xmlns:p14="http://schemas.microsoft.com/office/powerpoint/2010/main" val="1402496345"/>
       </p:ext>
     </p:extLst>
   </p:cSld>
@@ -1060,7 +1073,7 @@
           <a:p>
             <a:fld id="{A0D41147-8885-C046-8C0D-66CFA63AE48E}" type="datetimeFigureOut">
               <a:rPr lang="en-US" smtClean="0"/>
-              <a:t>4/10/15</a:t>
+              <a:t>4/15/15</a:t>
             </a:fld>
             <a:endParaRPr lang="en-US"/>
           </a:p>
@@ -1111,7 +1124,7 @@
     </p:spTree>
     <p:extLst>
       <p:ext uri="{BB962C8B-B14F-4D97-AF65-F5344CB8AC3E}">
-        <p14:creationId xmlns:p14="http://schemas.microsoft.com/office/powerpoint/2010/main" val="2998931650"/>
+        <p14:creationId xmlns:p14="http://schemas.microsoft.com/office/powerpoint/2010/main" val="3413179869"/>
       </p:ext>
     </p:extLst>
   </p:cSld>
@@ -1348,7 +1361,7 @@
           <a:p>
             <a:fld id="{A0D41147-8885-C046-8C0D-66CFA63AE48E}" type="datetimeFigureOut">
               <a:rPr lang="en-US" smtClean="0"/>
-              <a:t>4/10/15</a:t>
+              <a:t>4/15/15</a:t>
             </a:fld>
             <a:endParaRPr lang="en-US"/>
           </a:p>
@@ -1399,7 +1412,7 @@
     </p:spTree>
     <p:extLst>
       <p:ext uri="{BB962C8B-B14F-4D97-AF65-F5344CB8AC3E}">
-        <p14:creationId xmlns:p14="http://schemas.microsoft.com/office/powerpoint/2010/main" val="3350784220"/>
+        <p14:creationId xmlns:p14="http://schemas.microsoft.com/office/powerpoint/2010/main" val="2319861553"/>
       </p:ext>
     </p:extLst>
   </p:cSld>
@@ -1770,7 +1783,7 @@
           <a:p>
             <a:fld id="{A0D41147-8885-C046-8C0D-66CFA63AE48E}" type="datetimeFigureOut">
               <a:rPr lang="en-US" smtClean="0"/>
-              <a:t>4/10/15</a:t>
+              <a:t>4/15/15</a:t>
             </a:fld>
             <a:endParaRPr lang="en-US"/>
           </a:p>
@@ -1821,7 +1834,7 @@
     </p:spTree>
     <p:extLst>
       <p:ext uri="{BB962C8B-B14F-4D97-AF65-F5344CB8AC3E}">
-        <p14:creationId xmlns:p14="http://schemas.microsoft.com/office/powerpoint/2010/main" val="2656314075"/>
+        <p14:creationId xmlns:p14="http://schemas.microsoft.com/office/powerpoint/2010/main" val="607014658"/>
       </p:ext>
     </p:extLst>
   </p:cSld>
@@ -1888,7 +1901,7 @@
           <a:p>
             <a:fld id="{A0D41147-8885-C046-8C0D-66CFA63AE48E}" type="datetimeFigureOut">
               <a:rPr lang="en-US" smtClean="0"/>
-              <a:t>4/10/15</a:t>
+              <a:t>4/15/15</a:t>
             </a:fld>
             <a:endParaRPr lang="en-US"/>
           </a:p>
@@ -1939,7 +1952,7 @@
     </p:spTree>
     <p:extLst>
       <p:ext uri="{BB962C8B-B14F-4D97-AF65-F5344CB8AC3E}">
-        <p14:creationId xmlns:p14="http://schemas.microsoft.com/office/powerpoint/2010/main" val="1292624076"/>
+        <p14:creationId xmlns:p14="http://schemas.microsoft.com/office/powerpoint/2010/main" val="2908339083"/>
       </p:ext>
     </p:extLst>
   </p:cSld>
@@ -1983,7 +1996,7 @@
           <a:p>
             <a:fld id="{A0D41147-8885-C046-8C0D-66CFA63AE48E}" type="datetimeFigureOut">
               <a:rPr lang="en-US" smtClean="0"/>
-              <a:t>4/10/15</a:t>
+              <a:t>4/15/15</a:t>
             </a:fld>
             <a:endParaRPr lang="en-US"/>
           </a:p>
@@ -2034,7 +2047,7 @@
     </p:spTree>
     <p:extLst>
       <p:ext uri="{BB962C8B-B14F-4D97-AF65-F5344CB8AC3E}">
-        <p14:creationId xmlns:p14="http://schemas.microsoft.com/office/powerpoint/2010/main" val="3301999460"/>
+        <p14:creationId xmlns:p14="http://schemas.microsoft.com/office/powerpoint/2010/main" val="42005405"/>
       </p:ext>
     </p:extLst>
   </p:cSld>
@@ -2260,7 +2273,7 @@
           <a:p>
             <a:fld id="{A0D41147-8885-C046-8C0D-66CFA63AE48E}" type="datetimeFigureOut">
               <a:rPr lang="en-US" smtClean="0"/>
-              <a:t>4/10/15</a:t>
+              <a:t>4/15/15</a:t>
             </a:fld>
             <a:endParaRPr lang="en-US"/>
           </a:p>
@@ -2300,8 +2313,9 @@
           <a:bodyPr/>
           <a:lstStyle/>
           <a:p>
-            <a:fld id="{C374B3DF-974E-5C4A-8CEC-B44AA15C7764}" type="slidenum">
-              <a:rPr lang="en-US" smtClean="0"/>
+            <a:fld id="{6E2D2B3B-882E-40F3-A32F-6DD516915044}" type="slidenum">
+              <a:rPr lang="en-US" smtClean="0"/>
+              <a:pPr/>
               <a:t>‹#›</a:t>
             </a:fld>
             <a:endParaRPr lang="en-US"/>
@@ -2311,7 +2325,7 @@
     </p:spTree>
     <p:extLst>
       <p:ext uri="{BB962C8B-B14F-4D97-AF65-F5344CB8AC3E}">
-        <p14:creationId xmlns:p14="http://schemas.microsoft.com/office/powerpoint/2010/main" val="3390854926"/>
+        <p14:creationId xmlns:p14="http://schemas.microsoft.com/office/powerpoint/2010/main" val="1773136353"/>
       </p:ext>
     </p:extLst>
   </p:cSld>
@@ -2513,7 +2527,7 @@
           <a:p>
             <a:fld id="{A0D41147-8885-C046-8C0D-66CFA63AE48E}" type="datetimeFigureOut">
               <a:rPr lang="en-US" smtClean="0"/>
-              <a:t>4/10/15</a:t>
+              <a:t>4/15/15</a:t>
             </a:fld>
             <a:endParaRPr lang="en-US"/>
           </a:p>
@@ -2564,7 +2578,7 @@
     </p:spTree>
     <p:extLst>
       <p:ext uri="{BB962C8B-B14F-4D97-AF65-F5344CB8AC3E}">
-        <p14:creationId xmlns:p14="http://schemas.microsoft.com/office/powerpoint/2010/main" val="2254930566"/>
+        <p14:creationId xmlns:p14="http://schemas.microsoft.com/office/powerpoint/2010/main" val="96358758"/>
       </p:ext>
     </p:extLst>
   </p:cSld>
@@ -2578,9 +2592,16 @@
 <p:sldMaster xmlns:a="http://schemas.openxmlformats.org/drawingml/2006/main" xmlns:r="http://schemas.openxmlformats.org/officeDocument/2006/relationships" xmlns:p="http://schemas.openxmlformats.org/presentationml/2006/main">
   <p:cSld>
     <p:bg>
-      <p:bgRef idx="1001">
-        <a:schemeClr val="bg1"/>
-      </p:bgRef>
+      <p:bgPr>
+        <a:blipFill dpi="0" rotWithShape="1">
+          <a:blip r:embed="rId13"/>
+          <a:srcRect/>
+          <a:stretch>
+            <a:fillRect/>
+          </a:stretch>
+        </a:blipFill>
+        <a:effectLst/>
+      </p:bgPr>
     </p:bg>
     <p:spTree>
       <p:nvGrpSpPr>
@@ -2726,7 +2747,7 @@
           <a:p>
             <a:fld id="{A0D41147-8885-C046-8C0D-66CFA63AE48E}" type="datetimeFigureOut">
               <a:rPr lang="en-US" smtClean="0"/>
-              <a:t>4/10/15</a:t>
+              <a:t>4/15/15</a:t>
             </a:fld>
             <a:endParaRPr lang="en-US"/>
           </a:p>
@@ -2813,23 +2834,23 @@
     </p:spTree>
     <p:extLst>
       <p:ext uri="{BB962C8B-B14F-4D97-AF65-F5344CB8AC3E}">
-        <p14:creationId xmlns:p14="http://schemas.microsoft.com/office/powerpoint/2010/main" val="560371867"/>
+        <p14:creationId xmlns:p14="http://schemas.microsoft.com/office/powerpoint/2010/main" val="3346730759"/>
       </p:ext>
     </p:extLst>
   </p:cSld>
   <p:clrMap bg1="lt1" tx1="dk1" bg2="lt2" tx2="dk2" accent1="accent1" accent2="accent2" accent3="accent3" accent4="accent4" accent5="accent5" accent6="accent6" hlink="hlink" folHlink="folHlink"/>
   <p:sldLayoutIdLst>
-    <p:sldLayoutId id="2147483649" r:id="rId1"/>
-    <p:sldLayoutId id="2147483650" r:id="rId2"/>
-    <p:sldLayoutId id="2147483651" r:id="rId3"/>
-    <p:sldLayoutId id="2147483652" r:id="rId4"/>
-    <p:sldLayoutId id="2147483653" r:id="rId5"/>
-    <p:sldLayoutId id="2147483654" r:id="rId6"/>
-    <p:sldLayoutId id="2147483655" r:id="rId7"/>
-    <p:sldLayoutId id="2147483656" r:id="rId8"/>
-    <p:sldLayoutId id="2147483657" r:id="rId9"/>
-    <p:sldLayoutId id="2147483658" r:id="rId10"/>
-    <p:sldLayoutId id="2147483659" r:id="rId11"/>
+    <p:sldLayoutId id="2147483742" r:id="rId1"/>
+    <p:sldLayoutId id="2147483743" r:id="rId2"/>
+    <p:sldLayoutId id="2147483744" r:id="rId3"/>
+    <p:sldLayoutId id="2147483745" r:id="rId4"/>
+    <p:sldLayoutId id="2147483746" r:id="rId5"/>
+    <p:sldLayoutId id="2147483747" r:id="rId6"/>
+    <p:sldLayoutId id="2147483748" r:id="rId7"/>
+    <p:sldLayoutId id="2147483749" r:id="rId8"/>
+    <p:sldLayoutId id="2147483750" r:id="rId9"/>
+    <p:sldLayoutId id="2147483751" r:id="rId10"/>
+    <p:sldLayoutId id="2147483752" r:id="rId11"/>
   </p:sldLayoutIdLst>
   <p:txStyles>
     <p:titleStyle>
@@ -3111,16 +3132,29 @@
             <p:ph type="ctrTitle"/>
           </p:nvPr>
         </p:nvSpPr>
-        <p:spPr/>
-        <p:txBody>
-          <a:bodyPr/>
-          <a:lstStyle/>
-          <a:p>
-            <a:r>
-              <a:rPr lang="en-US" dirty="0" smtClean="0"/>
+        <p:spPr>
+          <a:xfrm>
+            <a:off x="685800" y="1368443"/>
+            <a:ext cx="7772400" cy="1470025"/>
+          </a:xfrm>
+        </p:spPr>
+        <p:txBody>
+          <a:bodyPr>
+            <a:normAutofit/>
+          </a:bodyPr>
+          <a:lstStyle/>
+          <a:p>
+            <a:r>
+              <a:rPr lang="en-US" sz="6500" dirty="0" smtClean="0">
+                <a:latin typeface="Unlock Regular"/>
+                <a:cs typeface="Unlock Regular"/>
+              </a:rPr>
               <a:t>Switch It Up</a:t>
             </a:r>
-            <a:endParaRPr lang="en-US" dirty="0"/>
+            <a:endParaRPr lang="en-US" sz="6500" dirty="0">
+              <a:latin typeface="Unlock Regular"/>
+              <a:cs typeface="Unlock Regular"/>
+            </a:endParaRPr>
           </a:p>
         </p:txBody>
       </p:sp>
@@ -3134,12 +3168,161 @@
             <p:ph type="subTitle" idx="1"/>
           </p:nvPr>
         </p:nvSpPr>
-        <p:spPr/>
-        <p:txBody>
-          <a:bodyPr/>
-          <a:lstStyle/>
-          <a:p>
-            <a:endParaRPr lang="en-US"/>
+        <p:spPr>
+          <a:xfrm>
+            <a:off x="1371600" y="3632206"/>
+            <a:ext cx="6400800" cy="1752600"/>
+          </a:xfrm>
+        </p:spPr>
+        <p:txBody>
+          <a:bodyPr>
+            <a:noAutofit/>
+          </a:bodyPr>
+          <a:lstStyle/>
+          <a:p>
+            <a:pPr>
+              <a:lnSpc>
+                <a:spcPct val="90000"/>
+              </a:lnSpc>
+            </a:pPr>
+            <a:r>
+              <a:rPr lang="en-US" sz="2400" dirty="0" smtClean="0">
+                <a:cs typeface="Antic"/>
+              </a:rPr>
+              <a:t>David Cheng</a:t>
+            </a:r>
+            <a:endParaRPr lang="en-US" sz="2400" dirty="0">
+              <a:cs typeface="Antic"/>
+            </a:endParaRPr>
+          </a:p>
+          <a:p>
+            <a:pPr>
+              <a:lnSpc>
+                <a:spcPct val="90000"/>
+              </a:lnSpc>
+            </a:pPr>
+            <a:r>
+              <a:rPr lang="en-US" sz="2400" dirty="0" smtClean="0">
+                <a:cs typeface="Antic"/>
+              </a:rPr>
+              <a:t>Danielle Connolly</a:t>
+            </a:r>
+          </a:p>
+          <a:p>
+            <a:pPr>
+              <a:lnSpc>
+                <a:spcPct val="90000"/>
+              </a:lnSpc>
+            </a:pPr>
+            <a:r>
+              <a:rPr lang="en-US" sz="2400" dirty="0" smtClean="0">
+                <a:cs typeface="Antic"/>
+              </a:rPr>
+              <a:t>Claire </a:t>
+            </a:r>
+            <a:r>
+              <a:rPr lang="en-US" sz="2400" dirty="0" err="1" smtClean="0">
+                <a:cs typeface="Antic"/>
+              </a:rPr>
+              <a:t>Rehfuss</a:t>
+            </a:r>
+            <a:endParaRPr lang="en-US" sz="2400" dirty="0" smtClean="0">
+              <a:cs typeface="Antic"/>
+            </a:endParaRPr>
+          </a:p>
+          <a:p>
+            <a:pPr>
+              <a:lnSpc>
+                <a:spcPct val="90000"/>
+              </a:lnSpc>
+            </a:pPr>
+            <a:r>
+              <a:rPr lang="en-US" sz="2400" dirty="0" smtClean="0">
+                <a:cs typeface="Antic"/>
+              </a:rPr>
+              <a:t>Tyler </a:t>
+            </a:r>
+            <a:r>
+              <a:rPr lang="en-US" sz="2400" dirty="0" smtClean="0">
+                <a:solidFill>
+                  <a:schemeClr val="bg1">
+                    <a:lumMod val="50000"/>
+                  </a:schemeClr>
+                </a:solidFill>
+                <a:cs typeface="Antic"/>
+              </a:rPr>
+              <a:t>Simpson</a:t>
+            </a:r>
+          </a:p>
+        </p:txBody>
+      </p:sp>
+      <p:sp>
+        <p:nvSpPr>
+          <p:cNvPr id="5" name="TextBox 4"/>
+          <p:cNvSpPr txBox="1"/>
+          <p:nvPr/>
+        </p:nvSpPr>
+        <p:spPr>
+          <a:xfrm>
+            <a:off x="2344615" y="5666154"/>
+            <a:ext cx="4474307" cy="369332"/>
+          </a:xfrm>
+          <a:prstGeom prst="rect">
+            <a:avLst/>
+          </a:prstGeom>
+          <a:noFill/>
+        </p:spPr>
+        <p:txBody>
+          <a:bodyPr wrap="square" rtlCol="0">
+            <a:spAutoFit/>
+          </a:bodyPr>
+          <a:lstStyle/>
+          <a:p>
+            <a:pPr algn="ctr"/>
+            <a:r>
+              <a:rPr lang="en-US" dirty="0" smtClean="0">
+                <a:solidFill>
+                  <a:srgbClr val="7F7F7F"/>
+                </a:solidFill>
+              </a:rPr>
+              <a:t>University of Michigan, Ann Arbor</a:t>
+            </a:r>
+            <a:endParaRPr lang="en-US" dirty="0">
+              <a:solidFill>
+                <a:srgbClr val="7F7F7F"/>
+              </a:solidFill>
+            </a:endParaRPr>
+          </a:p>
+        </p:txBody>
+      </p:sp>
+      <p:sp>
+        <p:nvSpPr>
+          <p:cNvPr id="6" name="TextBox 5"/>
+          <p:cNvSpPr txBox="1"/>
+          <p:nvPr/>
+        </p:nvSpPr>
+        <p:spPr>
+          <a:xfrm>
+            <a:off x="353646" y="2682242"/>
+            <a:ext cx="8458200" cy="507831"/>
+          </a:xfrm>
+          <a:prstGeom prst="rect">
+            <a:avLst/>
+          </a:prstGeom>
+          <a:noFill/>
+        </p:spPr>
+        <p:txBody>
+          <a:bodyPr wrap="square" rtlCol="0">
+            <a:spAutoFit/>
+          </a:bodyPr>
+          <a:lstStyle/>
+          <a:p>
+            <a:pPr algn="ctr"/>
+            <a:r>
+              <a:rPr lang="en-US" sz="2700" dirty="0" smtClean="0"/>
+              <a:t>A game to benefit children with autism spectrum disorder</a:t>
+            </a:r>
+            <a:endParaRPr lang="en-US" sz="2700" dirty="0"/>
           </a:p>
         </p:txBody>
       </p:sp>
@@ -3153,6 +3336,1088 @@
   <p:clrMapOvr>
     <a:masterClrMapping/>
   </p:clrMapOvr>
+  <p:timing>
+    <p:tnLst>
+      <p:par>
+        <p:cTn xmlns:p14="http://schemas.microsoft.com/office/powerpoint/2010/main" id="1" dur="indefinite" restart="never" nodeType="tmRoot"/>
+      </p:par>
+    </p:tnLst>
+  </p:timing>
+</p:sld>
+</file>
+
+<file path=ppt/slides/slide10.xml><?xml version="1.0" encoding="utf-8"?>
+<p:sld xmlns:a="http://schemas.openxmlformats.org/drawingml/2006/main" xmlns:r="http://schemas.openxmlformats.org/officeDocument/2006/relationships" xmlns:p="http://schemas.openxmlformats.org/presentationml/2006/main">
+  <p:cSld>
+    <p:bg>
+      <p:bgPr>
+        <a:solidFill>
+          <a:schemeClr val="tx1"/>
+        </a:solidFill>
+        <a:effectLst/>
+      </p:bgPr>
+    </p:bg>
+    <p:spTree>
+      <p:nvGrpSpPr>
+        <p:cNvPr id="1" name=""/>
+        <p:cNvGrpSpPr/>
+        <p:nvPr/>
+      </p:nvGrpSpPr>
+      <p:grpSpPr>
+        <a:xfrm>
+          <a:off x="0" y="0"/>
+          <a:ext cx="0" cy="0"/>
+          <a:chOff x="0" y="0"/>
+          <a:chExt cx="0" cy="0"/>
+        </a:xfrm>
+      </p:grpSpPr>
+      <p:pic>
+        <p:nvPicPr>
+          <p:cNvPr id="3074" name="Picture 2" descr="C:\Users\Nu11\Documents\ShareX\Screenshots\2015-04\Switch_It_Up_2015-04-13_22-36-50.png"/>
+          <p:cNvPicPr>
+            <a:picLocks noChangeAspect="1" noChangeArrowheads="1"/>
+          </p:cNvPicPr>
+          <p:nvPr/>
+        </p:nvPicPr>
+        <p:blipFill rotWithShape="1">
+          <a:blip r:embed="rId2">
+            <a:extLst>
+              <a:ext uri="{28A0092B-C50C-407E-A947-70E740481C1C}">
+                <a14:useLocalDpi xmlns:a14="http://schemas.microsoft.com/office/drawing/2010/main" val="0"/>
+              </a:ext>
+            </a:extLst>
+          </a:blip>
+          <a:srcRect l="4032" t="5598" r="3171" b="3706"/>
+          <a:stretch/>
+        </p:blipFill>
+        <p:spPr bwMode="auto">
+          <a:xfrm>
+            <a:off x="351684" y="0"/>
+            <a:ext cx="8479692" cy="6869532"/>
+          </a:xfrm>
+          <a:prstGeom prst="rect">
+            <a:avLst/>
+          </a:prstGeom>
+          <a:noFill/>
+          <a:extLst>
+            <a:ext uri="{909E8E84-426E-40dd-AFC4-6F175D3DCCD1}">
+              <a14:hiddenFill xmlns:a14="http://schemas.microsoft.com/office/drawing/2010/main">
+                <a:solidFill>
+                  <a:srgbClr val="FFFFFF"/>
+                </a:solidFill>
+              </a14:hiddenFill>
+            </a:ext>
+          </a:extLst>
+        </p:spPr>
+      </p:pic>
+    </p:spTree>
+    <p:extLst>
+      <p:ext uri="{BB962C8B-B14F-4D97-AF65-F5344CB8AC3E}">
+        <p14:creationId xmlns:p14="http://schemas.microsoft.com/office/powerpoint/2010/main" val="508426917"/>
+      </p:ext>
+    </p:extLst>
+  </p:cSld>
+  <p:clrMapOvr>
+    <a:masterClrMapping/>
+  </p:clrMapOvr>
+  <p:timing>
+    <p:tnLst>
+      <p:par>
+        <p:cTn xmlns:p14="http://schemas.microsoft.com/office/powerpoint/2010/main" id="1" dur="indefinite" restart="never" nodeType="tmRoot"/>
+      </p:par>
+    </p:tnLst>
+  </p:timing>
+</p:sld>
+</file>
+
+<file path=ppt/slides/slide11.xml><?xml version="1.0" encoding="utf-8"?>
+<p:sld xmlns:a="http://schemas.openxmlformats.org/drawingml/2006/main" xmlns:r="http://schemas.openxmlformats.org/officeDocument/2006/relationships" xmlns:p="http://schemas.openxmlformats.org/presentationml/2006/main">
+  <p:cSld>
+    <p:bg>
+      <p:bgPr>
+        <a:solidFill>
+          <a:schemeClr val="tx1"/>
+        </a:solidFill>
+        <a:effectLst/>
+      </p:bgPr>
+    </p:bg>
+    <p:spTree>
+      <p:nvGrpSpPr>
+        <p:cNvPr id="1" name=""/>
+        <p:cNvGrpSpPr/>
+        <p:nvPr/>
+      </p:nvGrpSpPr>
+      <p:grpSpPr>
+        <a:xfrm>
+          <a:off x="0" y="0"/>
+          <a:ext cx="0" cy="0"/>
+          <a:chOff x="0" y="0"/>
+          <a:chExt cx="0" cy="0"/>
+        </a:xfrm>
+      </p:grpSpPr>
+      <p:pic>
+        <p:nvPicPr>
+          <p:cNvPr id="5123" name="Picture 3" descr="C:\Users\Nu11\Documents\ShareX\Screenshots\2015-04\Switch_It_Up_2015-04-14_12-08-28.png"/>
+          <p:cNvPicPr>
+            <a:picLocks noChangeAspect="1" noChangeArrowheads="1"/>
+          </p:cNvPicPr>
+          <p:nvPr/>
+        </p:nvPicPr>
+        <p:blipFill rotWithShape="1">
+          <a:blip r:embed="rId2">
+            <a:extLst>
+              <a:ext uri="{28A0092B-C50C-407E-A947-70E740481C1C}">
+                <a14:useLocalDpi xmlns:a14="http://schemas.microsoft.com/office/drawing/2010/main" val="0"/>
+              </a:ext>
+            </a:extLst>
+          </a:blip>
+          <a:srcRect l="3157" t="5396" r="3088"/>
+          <a:stretch/>
+        </p:blipFill>
+        <p:spPr bwMode="auto">
+          <a:xfrm>
+            <a:off x="307284" y="0"/>
+            <a:ext cx="8563174" cy="6835558"/>
+          </a:xfrm>
+          <a:prstGeom prst="rect">
+            <a:avLst/>
+          </a:prstGeom>
+          <a:noFill/>
+          <a:extLst>
+            <a:ext uri="{909E8E84-426E-40dd-AFC4-6F175D3DCCD1}">
+              <a14:hiddenFill xmlns:a14="http://schemas.microsoft.com/office/drawing/2010/main">
+                <a:solidFill>
+                  <a:srgbClr val="FFFFFF"/>
+                </a:solidFill>
+              </a14:hiddenFill>
+            </a:ext>
+          </a:extLst>
+        </p:spPr>
+      </p:pic>
+    </p:spTree>
+    <p:extLst>
+      <p:ext uri="{BB962C8B-B14F-4D97-AF65-F5344CB8AC3E}">
+        <p14:creationId xmlns:p14="http://schemas.microsoft.com/office/powerpoint/2010/main" val="3870918398"/>
+      </p:ext>
+    </p:extLst>
+  </p:cSld>
+  <p:clrMapOvr>
+    <a:masterClrMapping/>
+  </p:clrMapOvr>
+  <p:timing>
+    <p:tnLst>
+      <p:par>
+        <p:cTn xmlns:p14="http://schemas.microsoft.com/office/powerpoint/2010/main" id="1" dur="indefinite" restart="never" nodeType="tmRoot"/>
+      </p:par>
+    </p:tnLst>
+  </p:timing>
+</p:sld>
+</file>
+
+<file path=ppt/slides/slide12.xml><?xml version="1.0" encoding="utf-8"?>
+<p:sld xmlns:a="http://schemas.openxmlformats.org/drawingml/2006/main" xmlns:r="http://schemas.openxmlformats.org/officeDocument/2006/relationships" xmlns:p="http://schemas.openxmlformats.org/presentationml/2006/main">
+  <p:cSld>
+    <p:bg>
+      <p:bgPr>
+        <a:solidFill>
+          <a:schemeClr val="tx1"/>
+        </a:solidFill>
+        <a:effectLst/>
+      </p:bgPr>
+    </p:bg>
+    <p:spTree>
+      <p:nvGrpSpPr>
+        <p:cNvPr id="1" name=""/>
+        <p:cNvGrpSpPr/>
+        <p:nvPr/>
+      </p:nvGrpSpPr>
+      <p:grpSpPr>
+        <a:xfrm>
+          <a:off x="0" y="0"/>
+          <a:ext cx="0" cy="0"/>
+          <a:chOff x="0" y="0"/>
+          <a:chExt cx="0" cy="0"/>
+        </a:xfrm>
+      </p:grpSpPr>
+      <p:pic>
+        <p:nvPicPr>
+          <p:cNvPr id="4098" name="Picture 2" descr="C:\Users\Nu11\Documents\ShareX\Screenshots\2015-04\Switch_It_Up_2015-04-13_22-37-48.png"/>
+          <p:cNvPicPr>
+            <a:picLocks noChangeAspect="1" noChangeArrowheads="1"/>
+          </p:cNvPicPr>
+          <p:nvPr/>
+        </p:nvPicPr>
+        <p:blipFill rotWithShape="1">
+          <a:blip r:embed="rId2">
+            <a:extLst>
+              <a:ext uri="{28A0092B-C50C-407E-A947-70E740481C1C}">
+                <a14:useLocalDpi xmlns:a14="http://schemas.microsoft.com/office/drawing/2010/main" val="0"/>
+              </a:ext>
+            </a:extLst>
+          </a:blip>
+          <a:srcRect l="3095" t="5258" r="3155" b="3727"/>
+          <a:stretch/>
+        </p:blipFill>
+        <p:spPr bwMode="auto">
+          <a:xfrm>
+            <a:off x="332145" y="-1"/>
+            <a:ext cx="8499231" cy="6839225"/>
+          </a:xfrm>
+          <a:prstGeom prst="rect">
+            <a:avLst/>
+          </a:prstGeom>
+          <a:noFill/>
+          <a:extLst>
+            <a:ext uri="{909E8E84-426E-40dd-AFC4-6F175D3DCCD1}">
+              <a14:hiddenFill xmlns:a14="http://schemas.microsoft.com/office/drawing/2010/main">
+                <a:solidFill>
+                  <a:srgbClr val="FFFFFF"/>
+                </a:solidFill>
+              </a14:hiddenFill>
+            </a:ext>
+          </a:extLst>
+        </p:spPr>
+      </p:pic>
+    </p:spTree>
+    <p:extLst>
+      <p:ext uri="{BB962C8B-B14F-4D97-AF65-F5344CB8AC3E}">
+        <p14:creationId xmlns:p14="http://schemas.microsoft.com/office/powerpoint/2010/main" val="3409558252"/>
+      </p:ext>
+    </p:extLst>
+  </p:cSld>
+  <p:clrMapOvr>
+    <a:masterClrMapping/>
+  </p:clrMapOvr>
+  <p:timing>
+    <p:tnLst>
+      <p:par>
+        <p:cTn xmlns:p14="http://schemas.microsoft.com/office/powerpoint/2010/main" id="1" dur="indefinite" restart="never" nodeType="tmRoot"/>
+      </p:par>
+    </p:tnLst>
+  </p:timing>
+</p:sld>
+</file>
+
+<file path=ppt/slides/slide13.xml><?xml version="1.0" encoding="utf-8"?>
+<p:sld xmlns:a="http://schemas.openxmlformats.org/drawingml/2006/main" xmlns:r="http://schemas.openxmlformats.org/officeDocument/2006/relationships" xmlns:p="http://schemas.openxmlformats.org/presentationml/2006/main">
+  <p:cSld>
+    <p:spTree>
+      <p:nvGrpSpPr>
+        <p:cNvPr id="1" name=""/>
+        <p:cNvGrpSpPr/>
+        <p:nvPr/>
+      </p:nvGrpSpPr>
+      <p:grpSpPr>
+        <a:xfrm>
+          <a:off x="0" y="0"/>
+          <a:ext cx="0" cy="0"/>
+          <a:chOff x="0" y="0"/>
+          <a:chExt cx="0" cy="0"/>
+        </a:xfrm>
+      </p:grpSpPr>
+      <p:sp>
+        <p:nvSpPr>
+          <p:cNvPr id="2" name="Title 1"/>
+          <p:cNvSpPr>
+            <a:spLocks noGrp="1"/>
+          </p:cNvSpPr>
+          <p:nvPr>
+            <p:ph type="title"/>
+          </p:nvPr>
+        </p:nvSpPr>
+        <p:spPr/>
+        <p:txBody>
+          <a:bodyPr/>
+          <a:lstStyle/>
+          <a:p>
+            <a:r>
+              <a:rPr lang="en-US" dirty="0" smtClean="0"/>
+              <a:t>Development and Testing</a:t>
+            </a:r>
+            <a:endParaRPr lang="en-US" dirty="0"/>
+          </a:p>
+        </p:txBody>
+      </p:sp>
+      <p:sp>
+        <p:nvSpPr>
+          <p:cNvPr id="3" name="Content Placeholder 2"/>
+          <p:cNvSpPr>
+            <a:spLocks noGrp="1"/>
+          </p:cNvSpPr>
+          <p:nvPr>
+            <p:ph idx="1"/>
+          </p:nvPr>
+        </p:nvSpPr>
+        <p:spPr/>
+        <p:txBody>
+          <a:bodyPr/>
+          <a:lstStyle/>
+          <a:p>
+            <a:r>
+              <a:rPr lang="en-US" dirty="0" smtClean="0"/>
+              <a:t>Alpha Release</a:t>
+            </a:r>
+          </a:p>
+          <a:p>
+            <a:r>
+              <a:rPr lang="en-US" dirty="0"/>
+              <a:t>Beta Release</a:t>
+            </a:r>
+            <a:endParaRPr lang="en-US" dirty="0" smtClean="0"/>
+          </a:p>
+          <a:p>
+            <a:r>
+              <a:rPr lang="en-US" dirty="0"/>
+              <a:t>Final Release</a:t>
+            </a:r>
+            <a:endParaRPr lang="en-US" dirty="0" smtClean="0"/>
+          </a:p>
+        </p:txBody>
+      </p:sp>
+    </p:spTree>
+    <p:extLst>
+      <p:ext uri="{BB962C8B-B14F-4D97-AF65-F5344CB8AC3E}">
+        <p14:creationId xmlns:p14="http://schemas.microsoft.com/office/powerpoint/2010/main" val="2521740793"/>
+      </p:ext>
+    </p:extLst>
+  </p:cSld>
+  <p:clrMapOvr>
+    <a:masterClrMapping/>
+  </p:clrMapOvr>
+  <p:timing>
+    <p:tnLst>
+      <p:par>
+        <p:cTn xmlns:p14="http://schemas.microsoft.com/office/powerpoint/2010/main" id="1" dur="indefinite" restart="never" nodeType="tmRoot"/>
+      </p:par>
+    </p:tnLst>
+  </p:timing>
+</p:sld>
+</file>
+
+<file path=ppt/slides/slide14.xml><?xml version="1.0" encoding="utf-8"?>
+<p:sld xmlns:a="http://schemas.openxmlformats.org/drawingml/2006/main" xmlns:r="http://schemas.openxmlformats.org/officeDocument/2006/relationships" xmlns:p="http://schemas.openxmlformats.org/presentationml/2006/main">
+  <p:cSld>
+    <p:spTree>
+      <p:nvGrpSpPr>
+        <p:cNvPr id="1" name=""/>
+        <p:cNvGrpSpPr/>
+        <p:nvPr/>
+      </p:nvGrpSpPr>
+      <p:grpSpPr>
+        <a:xfrm>
+          <a:off x="0" y="0"/>
+          <a:ext cx="0" cy="0"/>
+          <a:chOff x="0" y="0"/>
+          <a:chExt cx="0" cy="0"/>
+        </a:xfrm>
+      </p:grpSpPr>
+      <p:sp>
+        <p:nvSpPr>
+          <p:cNvPr id="2" name="Title 1"/>
+          <p:cNvSpPr>
+            <a:spLocks noGrp="1"/>
+          </p:cNvSpPr>
+          <p:nvPr>
+            <p:ph type="title"/>
+          </p:nvPr>
+        </p:nvSpPr>
+        <p:spPr/>
+        <p:txBody>
+          <a:bodyPr/>
+          <a:lstStyle/>
+          <a:p>
+            <a:r>
+              <a:rPr lang="en-US" dirty="0" smtClean="0"/>
+              <a:t>Alpha Release: Ground Work</a:t>
+            </a:r>
+            <a:endParaRPr lang="en-US" dirty="0"/>
+          </a:p>
+        </p:txBody>
+      </p:sp>
+      <p:sp>
+        <p:nvSpPr>
+          <p:cNvPr id="3" name="Content Placeholder 2"/>
+          <p:cNvSpPr>
+            <a:spLocks noGrp="1"/>
+          </p:cNvSpPr>
+          <p:nvPr>
+            <p:ph idx="1"/>
+          </p:nvPr>
+        </p:nvSpPr>
+        <p:spPr/>
+        <p:txBody>
+          <a:bodyPr/>
+          <a:lstStyle/>
+          <a:p>
+            <a:pPr lvl="1">
+              <a:buFont typeface="Arial" panose="020B0604020202020204" pitchFamily="34" charset="0"/>
+              <a:buChar char="•"/>
+            </a:pPr>
+            <a:r>
+              <a:rPr lang="en-US" dirty="0" smtClean="0"/>
+              <a:t>Moving Avatar</a:t>
+            </a:r>
+          </a:p>
+          <a:p>
+            <a:pPr lvl="1">
+              <a:buFont typeface="Arial" panose="020B0604020202020204" pitchFamily="34" charset="0"/>
+              <a:buChar char="•"/>
+            </a:pPr>
+            <a:r>
+              <a:rPr lang="en-US" dirty="0" smtClean="0"/>
+              <a:t>Graphics</a:t>
+            </a:r>
+          </a:p>
+          <a:p>
+            <a:pPr lvl="1">
+              <a:buFont typeface="Arial" panose="020B0604020202020204" pitchFamily="34" charset="0"/>
+              <a:buChar char="•"/>
+            </a:pPr>
+            <a:r>
+              <a:rPr lang="en-US" dirty="0" smtClean="0"/>
+              <a:t>Key Mapping Function</a:t>
+            </a:r>
+          </a:p>
+          <a:p>
+            <a:pPr lvl="1">
+              <a:buFont typeface="Arial" panose="020B0604020202020204" pitchFamily="34" charset="0"/>
+              <a:buChar char="•"/>
+            </a:pPr>
+            <a:r>
+              <a:rPr lang="en-US" dirty="0" smtClean="0"/>
+              <a:t>Sample Mazes</a:t>
+            </a:r>
+            <a:endParaRPr lang="en-US" dirty="0"/>
+          </a:p>
+        </p:txBody>
+      </p:sp>
+    </p:spTree>
+    <p:extLst>
+      <p:ext uri="{BB962C8B-B14F-4D97-AF65-F5344CB8AC3E}">
+        <p14:creationId xmlns:p14="http://schemas.microsoft.com/office/powerpoint/2010/main" val="2243030512"/>
+      </p:ext>
+    </p:extLst>
+  </p:cSld>
+  <p:clrMapOvr>
+    <a:masterClrMapping/>
+  </p:clrMapOvr>
+  <p:timing>
+    <p:tnLst>
+      <p:par>
+        <p:cTn xmlns:p14="http://schemas.microsoft.com/office/powerpoint/2010/main" id="1" dur="indefinite" restart="never" nodeType="tmRoot"/>
+      </p:par>
+    </p:tnLst>
+  </p:timing>
+</p:sld>
+</file>
+
+<file path=ppt/slides/slide15.xml><?xml version="1.0" encoding="utf-8"?>
+<p:sld xmlns:a="http://schemas.openxmlformats.org/drawingml/2006/main" xmlns:r="http://schemas.openxmlformats.org/officeDocument/2006/relationships" xmlns:p="http://schemas.openxmlformats.org/presentationml/2006/main">
+  <p:cSld>
+    <p:spTree>
+      <p:nvGrpSpPr>
+        <p:cNvPr id="1" name=""/>
+        <p:cNvGrpSpPr/>
+        <p:nvPr/>
+      </p:nvGrpSpPr>
+      <p:grpSpPr>
+        <a:xfrm>
+          <a:off x="0" y="0"/>
+          <a:ext cx="0" cy="0"/>
+          <a:chOff x="0" y="0"/>
+          <a:chExt cx="0" cy="0"/>
+        </a:xfrm>
+      </p:grpSpPr>
+      <p:sp>
+        <p:nvSpPr>
+          <p:cNvPr id="2" name="Title 1"/>
+          <p:cNvSpPr>
+            <a:spLocks noGrp="1"/>
+          </p:cNvSpPr>
+          <p:nvPr>
+            <p:ph type="title"/>
+          </p:nvPr>
+        </p:nvSpPr>
+        <p:spPr/>
+        <p:txBody>
+          <a:bodyPr/>
+          <a:lstStyle/>
+          <a:p>
+            <a:r>
+              <a:rPr lang="en-US" dirty="0" smtClean="0"/>
+              <a:t>Beta Release: Adding Complexity</a:t>
+            </a:r>
+            <a:endParaRPr lang="en-US" dirty="0"/>
+          </a:p>
+        </p:txBody>
+      </p:sp>
+      <p:sp>
+        <p:nvSpPr>
+          <p:cNvPr id="3" name="Content Placeholder 2"/>
+          <p:cNvSpPr>
+            <a:spLocks noGrp="1"/>
+          </p:cNvSpPr>
+          <p:nvPr>
+            <p:ph sz="half" idx="1"/>
+          </p:nvPr>
+        </p:nvSpPr>
+        <p:spPr/>
+        <p:txBody>
+          <a:bodyPr/>
+          <a:lstStyle/>
+          <a:p>
+            <a:r>
+              <a:rPr lang="en-US" dirty="0"/>
+              <a:t>Fixing Collisions</a:t>
+            </a:r>
+          </a:p>
+          <a:p>
+            <a:r>
+              <a:rPr lang="en-US" dirty="0"/>
+              <a:t>Dynamic Hints</a:t>
+            </a:r>
+          </a:p>
+          <a:p>
+            <a:r>
+              <a:rPr lang="en-US" dirty="0" smtClean="0"/>
+              <a:t>Hazards</a:t>
+            </a:r>
+          </a:p>
+          <a:p>
+            <a:pPr lvl="1"/>
+            <a:r>
+              <a:rPr lang="en-US" dirty="0" smtClean="0"/>
+              <a:t>Sounds</a:t>
+            </a:r>
+            <a:endParaRPr lang="en-US" dirty="0"/>
+          </a:p>
+          <a:p>
+            <a:r>
+              <a:rPr lang="en-US" dirty="0"/>
+              <a:t>Avatar Customization</a:t>
+            </a:r>
+          </a:p>
+          <a:p>
+            <a:r>
+              <a:rPr lang="en-US" dirty="0"/>
+              <a:t>Multiple Mazes</a:t>
+            </a:r>
+          </a:p>
+        </p:txBody>
+      </p:sp>
+      <p:pic>
+        <p:nvPicPr>
+          <p:cNvPr id="6" name="Picture 2" descr="C:\Users\Nu11\Documents\ShareX\Screenshots\2015-04\Level_1_2015-04-13_17-32-02.png"/>
+          <p:cNvPicPr>
+            <a:picLocks noGrp="1" noChangeAspect="1" noChangeArrowheads="1"/>
+          </p:cNvPicPr>
+          <p:nvPr>
+            <p:ph sz="half" idx="2"/>
+          </p:nvPr>
+        </p:nvPicPr>
+        <p:blipFill rotWithShape="1">
+          <a:blip r:embed="rId2">
+            <a:extLst>
+              <a:ext uri="{28A0092B-C50C-407E-A947-70E740481C1C}">
+                <a14:useLocalDpi xmlns:a14="http://schemas.microsoft.com/office/drawing/2010/main" val="0"/>
+              </a:ext>
+            </a:extLst>
+          </a:blip>
+          <a:srcRect l="2988" t="7516" r="3044" b="3098"/>
+          <a:stretch/>
+        </p:blipFill>
+        <p:spPr bwMode="auto">
+          <a:xfrm>
+            <a:off x="4495800" y="1600200"/>
+            <a:ext cx="4038600" cy="3248178"/>
+          </a:xfrm>
+          <a:prstGeom prst="rect">
+            <a:avLst/>
+          </a:prstGeom>
+          <a:solidFill>
+            <a:srgbClr val="FFFFFF">
+              <a:shade val="85000"/>
+            </a:srgbClr>
+          </a:solidFill>
+          <a:ln w="88900" cap="sq">
+            <a:solidFill>
+              <a:srgbClr val="FFFFFF"/>
+            </a:solidFill>
+            <a:miter lim="800000"/>
+          </a:ln>
+          <a:effectLst>
+            <a:outerShdw blurRad="55000" dist="18000" dir="5400000" algn="tl" rotWithShape="0">
+              <a:srgbClr val="000000">
+                <a:alpha val="40000"/>
+              </a:srgbClr>
+            </a:outerShdw>
+          </a:effectLst>
+          <a:scene3d>
+            <a:camera prst="orthographicFront"/>
+            <a:lightRig rig="twoPt" dir="t">
+              <a:rot lat="0" lon="0" rev="7200000"/>
+            </a:lightRig>
+          </a:scene3d>
+          <a:sp3d>
+            <a:bevelT w="25400" h="19050"/>
+            <a:contourClr>
+              <a:srgbClr val="FFFFFF"/>
+            </a:contourClr>
+          </a:sp3d>
+          <a:extLst/>
+        </p:spPr>
+      </p:pic>
+    </p:spTree>
+    <p:extLst>
+      <p:ext uri="{BB962C8B-B14F-4D97-AF65-F5344CB8AC3E}">
+        <p14:creationId xmlns:p14="http://schemas.microsoft.com/office/powerpoint/2010/main" val="1222222876"/>
+      </p:ext>
+    </p:extLst>
+  </p:cSld>
+  <p:clrMapOvr>
+    <a:masterClrMapping/>
+  </p:clrMapOvr>
+  <p:timing>
+    <p:tnLst>
+      <p:par>
+        <p:cTn xmlns:p14="http://schemas.microsoft.com/office/powerpoint/2010/main" id="1" dur="indefinite" restart="never" nodeType="tmRoot"/>
+      </p:par>
+    </p:tnLst>
+  </p:timing>
+</p:sld>
+</file>
+
+<file path=ppt/slides/slide16.xml><?xml version="1.0" encoding="utf-8"?>
+<p:sld xmlns:a="http://schemas.openxmlformats.org/drawingml/2006/main" xmlns:r="http://schemas.openxmlformats.org/officeDocument/2006/relationships" xmlns:p="http://schemas.openxmlformats.org/presentationml/2006/main">
+  <p:cSld>
+    <p:spTree>
+      <p:nvGrpSpPr>
+        <p:cNvPr id="1" name=""/>
+        <p:cNvGrpSpPr/>
+        <p:nvPr/>
+      </p:nvGrpSpPr>
+      <p:grpSpPr>
+        <a:xfrm>
+          <a:off x="0" y="0"/>
+          <a:ext cx="0" cy="0"/>
+          <a:chOff x="0" y="0"/>
+          <a:chExt cx="0" cy="0"/>
+        </a:xfrm>
+      </p:grpSpPr>
+      <p:sp>
+        <p:nvSpPr>
+          <p:cNvPr id="2" name="Title 1"/>
+          <p:cNvSpPr>
+            <a:spLocks noGrp="1"/>
+          </p:cNvSpPr>
+          <p:nvPr>
+            <p:ph type="title"/>
+          </p:nvPr>
+        </p:nvSpPr>
+        <p:spPr/>
+        <p:txBody>
+          <a:bodyPr/>
+          <a:lstStyle/>
+          <a:p>
+            <a:r>
+              <a:rPr lang="en-US" dirty="0" smtClean="0"/>
+              <a:t>Final Release: Finishing Touches</a:t>
+            </a:r>
+            <a:endParaRPr lang="en-US" dirty="0"/>
+          </a:p>
+        </p:txBody>
+      </p:sp>
+      <p:sp>
+        <p:nvSpPr>
+          <p:cNvPr id="3" name="Content Placeholder 2"/>
+          <p:cNvSpPr>
+            <a:spLocks noGrp="1"/>
+          </p:cNvSpPr>
+          <p:nvPr>
+            <p:ph idx="1"/>
+          </p:nvPr>
+        </p:nvSpPr>
+        <p:spPr/>
+        <p:txBody>
+          <a:bodyPr/>
+          <a:lstStyle/>
+          <a:p>
+            <a:r>
+              <a:rPr lang="en-US" dirty="0"/>
+              <a:t>Final Level</a:t>
+            </a:r>
+          </a:p>
+          <a:p>
+            <a:r>
+              <a:rPr lang="en-US" dirty="0"/>
+              <a:t>Adding Name Customization</a:t>
+            </a:r>
+          </a:p>
+          <a:p>
+            <a:pPr lvl="1"/>
+            <a:r>
+              <a:rPr lang="en-US" dirty="0"/>
+              <a:t>Cheat Codes</a:t>
+            </a:r>
+          </a:p>
+          <a:p>
+            <a:pPr lvl="1"/>
+            <a:r>
+              <a:rPr lang="en-US" dirty="0"/>
+              <a:t>Bonus Items</a:t>
+            </a:r>
+          </a:p>
+          <a:p>
+            <a:pPr marL="0" indent="0">
+              <a:buNone/>
+            </a:pPr>
+            <a:endParaRPr lang="en-US" dirty="0"/>
+          </a:p>
+        </p:txBody>
+      </p:sp>
+    </p:spTree>
+    <p:extLst>
+      <p:ext uri="{BB962C8B-B14F-4D97-AF65-F5344CB8AC3E}">
+        <p14:creationId xmlns:p14="http://schemas.microsoft.com/office/powerpoint/2010/main" val="2662510792"/>
+      </p:ext>
+    </p:extLst>
+  </p:cSld>
+  <p:clrMapOvr>
+    <a:masterClrMapping/>
+  </p:clrMapOvr>
+  <p:timing>
+    <p:tnLst>
+      <p:par>
+        <p:cTn xmlns:p14="http://schemas.microsoft.com/office/powerpoint/2010/main" id="1" dur="indefinite" restart="never" nodeType="tmRoot"/>
+      </p:par>
+    </p:tnLst>
+  </p:timing>
+</p:sld>
+</file>
+
+<file path=ppt/slides/slide17.xml><?xml version="1.0" encoding="utf-8"?>
+<p:sld xmlns:a="http://schemas.openxmlformats.org/drawingml/2006/main" xmlns:r="http://schemas.openxmlformats.org/officeDocument/2006/relationships" xmlns:p="http://schemas.openxmlformats.org/presentationml/2006/main">
+  <p:cSld>
+    <p:spTree>
+      <p:nvGrpSpPr>
+        <p:cNvPr id="1" name=""/>
+        <p:cNvGrpSpPr/>
+        <p:nvPr/>
+      </p:nvGrpSpPr>
+      <p:grpSpPr>
+        <a:xfrm>
+          <a:off x="0" y="0"/>
+          <a:ext cx="0" cy="0"/>
+          <a:chOff x="0" y="0"/>
+          <a:chExt cx="0" cy="0"/>
+        </a:xfrm>
+      </p:grpSpPr>
+      <p:sp>
+        <p:nvSpPr>
+          <p:cNvPr id="2" name="Title 1"/>
+          <p:cNvSpPr>
+            <a:spLocks noGrp="1"/>
+          </p:cNvSpPr>
+          <p:nvPr>
+            <p:ph type="title"/>
+          </p:nvPr>
+        </p:nvSpPr>
+        <p:spPr/>
+        <p:txBody>
+          <a:bodyPr/>
+          <a:lstStyle/>
+          <a:p>
+            <a:r>
+              <a:rPr lang="en-US" dirty="0" smtClean="0"/>
+              <a:t>Further Improvements</a:t>
+            </a:r>
+            <a:endParaRPr lang="en-US" dirty="0"/>
+          </a:p>
+        </p:txBody>
+      </p:sp>
+      <p:sp>
+        <p:nvSpPr>
+          <p:cNvPr id="3" name="Content Placeholder 2"/>
+          <p:cNvSpPr>
+            <a:spLocks noGrp="1"/>
+          </p:cNvSpPr>
+          <p:nvPr>
+            <p:ph idx="1"/>
+          </p:nvPr>
+        </p:nvSpPr>
+        <p:spPr/>
+        <p:txBody>
+          <a:bodyPr/>
+          <a:lstStyle/>
+          <a:p>
+            <a:r>
+              <a:rPr lang="en-US" dirty="0" smtClean="0"/>
+              <a:t>Develop more key mapping and maps</a:t>
+            </a:r>
+          </a:p>
+          <a:p>
+            <a:r>
+              <a:rPr lang="en-US" dirty="0" smtClean="0"/>
+              <a:t>Improve maze and dragon graphics</a:t>
+            </a:r>
+          </a:p>
+          <a:p>
+            <a:r>
+              <a:rPr lang="en-US" dirty="0" smtClean="0"/>
+              <a:t>Add more customizations</a:t>
+            </a:r>
+          </a:p>
+          <a:p>
+            <a:r>
+              <a:rPr lang="en-US" dirty="0" smtClean="0"/>
+              <a:t>Develop the backstory </a:t>
+            </a:r>
+          </a:p>
+          <a:p>
+            <a:endParaRPr lang="en-US" dirty="0" smtClean="0"/>
+          </a:p>
+          <a:p>
+            <a:endParaRPr lang="en-US" dirty="0"/>
+          </a:p>
+        </p:txBody>
+      </p:sp>
+    </p:spTree>
+    <p:extLst>
+      <p:ext uri="{BB962C8B-B14F-4D97-AF65-F5344CB8AC3E}">
+        <p14:creationId xmlns:p14="http://schemas.microsoft.com/office/powerpoint/2010/main" val="3213262387"/>
+      </p:ext>
+    </p:extLst>
+  </p:cSld>
+  <p:clrMapOvr>
+    <a:masterClrMapping/>
+  </p:clrMapOvr>
+  <p:timing>
+    <p:tnLst>
+      <p:par>
+        <p:cTn xmlns:p14="http://schemas.microsoft.com/office/powerpoint/2010/main" id="1" dur="indefinite" restart="never" nodeType="tmRoot"/>
+      </p:par>
+    </p:tnLst>
+  </p:timing>
+</p:sld>
+</file>
+
+<file path=ppt/slides/slide18.xml><?xml version="1.0" encoding="utf-8"?>
+<p:sld xmlns:a="http://schemas.openxmlformats.org/drawingml/2006/main" xmlns:r="http://schemas.openxmlformats.org/officeDocument/2006/relationships" xmlns:p="http://schemas.openxmlformats.org/presentationml/2006/main">
+  <p:cSld>
+    <p:spTree>
+      <p:nvGrpSpPr>
+        <p:cNvPr id="1" name=""/>
+        <p:cNvGrpSpPr/>
+        <p:nvPr/>
+      </p:nvGrpSpPr>
+      <p:grpSpPr>
+        <a:xfrm>
+          <a:off x="0" y="0"/>
+          <a:ext cx="0" cy="0"/>
+          <a:chOff x="0" y="0"/>
+          <a:chExt cx="0" cy="0"/>
+        </a:xfrm>
+      </p:grpSpPr>
+      <p:sp>
+        <p:nvSpPr>
+          <p:cNvPr id="2" name="Title 1"/>
+          <p:cNvSpPr>
+            <a:spLocks noGrp="1"/>
+          </p:cNvSpPr>
+          <p:nvPr>
+            <p:ph type="title"/>
+          </p:nvPr>
+        </p:nvSpPr>
+        <p:spPr/>
+        <p:txBody>
+          <a:bodyPr/>
+          <a:lstStyle/>
+          <a:p>
+            <a:r>
+              <a:rPr lang="en-US" dirty="0" smtClean="0"/>
+              <a:t>Conclusion</a:t>
+            </a:r>
+            <a:endParaRPr lang="en-US" dirty="0"/>
+          </a:p>
+        </p:txBody>
+      </p:sp>
+      <p:sp>
+        <p:nvSpPr>
+          <p:cNvPr id="3" name="Content Placeholder 2"/>
+          <p:cNvSpPr>
+            <a:spLocks noGrp="1"/>
+          </p:cNvSpPr>
+          <p:nvPr>
+            <p:ph idx="1"/>
+          </p:nvPr>
+        </p:nvSpPr>
+        <p:spPr/>
+        <p:txBody>
+          <a:bodyPr>
+            <a:normAutofit/>
+          </a:bodyPr>
+          <a:lstStyle/>
+          <a:p>
+            <a:r>
+              <a:rPr lang="en-US" sz="2400" dirty="0" smtClean="0"/>
+              <a:t>Switch It Up helps children with ASD cope with change</a:t>
+            </a:r>
+          </a:p>
+          <a:p>
+            <a:pPr lvl="1"/>
+            <a:r>
+              <a:rPr lang="en-US" sz="2400" dirty="0" smtClean="0"/>
+              <a:t>Changing </a:t>
+            </a:r>
+            <a:r>
+              <a:rPr lang="en-US" sz="2400" dirty="0" smtClean="0"/>
+              <a:t>key mapping</a:t>
+            </a:r>
+            <a:endParaRPr lang="en-US" sz="2400" dirty="0" smtClean="0"/>
+          </a:p>
+          <a:p>
+            <a:pPr lvl="1"/>
+            <a:r>
+              <a:rPr lang="en-US" sz="2400" dirty="0" smtClean="0"/>
+              <a:t>Various maze layouts</a:t>
+            </a:r>
+          </a:p>
+          <a:p>
+            <a:r>
+              <a:rPr lang="en-US" sz="2400" dirty="0" smtClean="0"/>
+              <a:t>Features other aspects to improve gameplay</a:t>
+            </a:r>
+          </a:p>
+          <a:p>
+            <a:pPr lvl="1"/>
+            <a:r>
+              <a:rPr lang="en-US" sz="2000" dirty="0" smtClean="0"/>
+              <a:t>Graphics</a:t>
+            </a:r>
+          </a:p>
+          <a:p>
+            <a:pPr lvl="1"/>
+            <a:r>
+              <a:rPr lang="en-US" sz="2000" dirty="0" smtClean="0"/>
+              <a:t>Sounds</a:t>
+            </a:r>
+          </a:p>
+          <a:p>
+            <a:pPr lvl="1"/>
+            <a:r>
+              <a:rPr lang="en-US" sz="2000" dirty="0" smtClean="0"/>
+              <a:t>Interactive items</a:t>
+            </a:r>
+          </a:p>
+          <a:p>
+            <a:pPr lvl="1"/>
+            <a:r>
+              <a:rPr lang="en-US" sz="2000" dirty="0" smtClean="0"/>
+              <a:t>Customization</a:t>
+            </a:r>
+          </a:p>
+          <a:p>
+            <a:pPr lvl="1"/>
+            <a:r>
+              <a:rPr lang="en-US" sz="2000" dirty="0" smtClean="0"/>
+              <a:t>Feedback</a:t>
+            </a:r>
+          </a:p>
+          <a:p>
+            <a:r>
+              <a:rPr lang="en-US" sz="2400" dirty="0" smtClean="0"/>
+              <a:t>Fulfilled the criteria and followed the constraints</a:t>
+            </a:r>
+            <a:endParaRPr lang="en-US" sz="2400" dirty="0" smtClean="0"/>
+          </a:p>
+          <a:p>
+            <a:pPr lvl="1"/>
+            <a:endParaRPr lang="en-US" dirty="0" smtClean="0"/>
+          </a:p>
+        </p:txBody>
+      </p:sp>
+    </p:spTree>
+    <p:extLst>
+      <p:ext uri="{BB962C8B-B14F-4D97-AF65-F5344CB8AC3E}">
+        <p14:creationId xmlns:p14="http://schemas.microsoft.com/office/powerpoint/2010/main" val="3527794848"/>
+      </p:ext>
+    </p:extLst>
+  </p:cSld>
+  <p:clrMapOvr>
+    <a:masterClrMapping/>
+  </p:clrMapOvr>
+  <p:timing>
+    <p:tnLst>
+      <p:par>
+        <p:cTn xmlns:p14="http://schemas.microsoft.com/office/powerpoint/2010/main" id="1" dur="indefinite" restart="never" nodeType="tmRoot"/>
+      </p:par>
+    </p:tnLst>
+  </p:timing>
+</p:sld>
+</file>
+
+<file path=ppt/slides/slide19.xml><?xml version="1.0" encoding="utf-8"?>
+<p:sld xmlns:a="http://schemas.openxmlformats.org/drawingml/2006/main" xmlns:r="http://schemas.openxmlformats.org/officeDocument/2006/relationships" xmlns:p="http://schemas.openxmlformats.org/presentationml/2006/main">
+  <p:cSld>
+    <p:spTree>
+      <p:nvGrpSpPr>
+        <p:cNvPr id="1" name=""/>
+        <p:cNvGrpSpPr/>
+        <p:nvPr/>
+      </p:nvGrpSpPr>
+      <p:grpSpPr>
+        <a:xfrm>
+          <a:off x="0" y="0"/>
+          <a:ext cx="0" cy="0"/>
+          <a:chOff x="0" y="0"/>
+          <a:chExt cx="0" cy="0"/>
+        </a:xfrm>
+      </p:grpSpPr>
+      <p:sp>
+        <p:nvSpPr>
+          <p:cNvPr id="2" name="Title 1"/>
+          <p:cNvSpPr>
+            <a:spLocks noGrp="1"/>
+          </p:cNvSpPr>
+          <p:nvPr>
+            <p:ph type="title"/>
+          </p:nvPr>
+        </p:nvSpPr>
+        <p:spPr>
+          <a:xfrm>
+            <a:off x="457200" y="2329199"/>
+            <a:ext cx="8229600" cy="1143000"/>
+          </a:xfrm>
+        </p:spPr>
+        <p:txBody>
+          <a:bodyPr/>
+          <a:lstStyle/>
+          <a:p>
+            <a:r>
+              <a:rPr lang="en-US" dirty="0" smtClean="0"/>
+              <a:t>Any Questions?</a:t>
+            </a:r>
+            <a:endParaRPr lang="en-US" dirty="0"/>
+          </a:p>
+        </p:txBody>
+      </p:sp>
+    </p:spTree>
+    <p:extLst>
+      <p:ext uri="{BB962C8B-B14F-4D97-AF65-F5344CB8AC3E}">
+        <p14:creationId xmlns:p14="http://schemas.microsoft.com/office/powerpoint/2010/main" val="3074169212"/>
+      </p:ext>
+    </p:extLst>
+  </p:cSld>
+  <p:clrMapOvr>
+    <a:masterClrMapping/>
+  </p:clrMapOvr>
+  <p:timing>
+    <p:tnLst>
+      <p:par>
+        <p:cTn xmlns:p14="http://schemas.microsoft.com/office/powerpoint/2010/main" id="1" dur="indefinite" restart="never" nodeType="tmRoot"/>
+      </p:par>
+    </p:tnLst>
+  </p:timing>
 </p:sld>
 </file>
 
@@ -3212,29 +4477,80 @@
           <a:lstStyle/>
           <a:p>
             <a:r>
+              <a:rPr lang="en-US" dirty="0" err="1" smtClean="0"/>
+              <a:t>Engr</a:t>
+            </a:r>
+            <a:r>
               <a:rPr lang="en-US" dirty="0" smtClean="0"/>
-              <a:t>Danielle</a:t>
-            </a:r>
-            <a:endParaRPr lang="en-US" dirty="0"/>
+              <a:t> 100 Section 650</a:t>
+            </a:r>
+          </a:p>
+          <a:p>
+            <a:pPr lvl="1"/>
+            <a:r>
+              <a:rPr lang="en-US" dirty="0" smtClean="0"/>
+              <a:t>Gaming for the Greater Good</a:t>
+            </a:r>
+          </a:p>
+          <a:p>
+            <a:r>
+              <a:rPr lang="en-US" dirty="0" smtClean="0"/>
+              <a:t>Autism spectrum </a:t>
+            </a:r>
+            <a:r>
+              <a:rPr lang="en-US" dirty="0" smtClean="0"/>
+              <a:t>disorder</a:t>
+            </a:r>
+          </a:p>
+          <a:p>
+            <a:r>
+              <a:rPr lang="en-US" dirty="0" smtClean="0"/>
+              <a:t>Three releases</a:t>
+            </a:r>
+          </a:p>
+          <a:p>
+            <a:r>
+              <a:rPr lang="en-US" dirty="0" smtClean="0"/>
+              <a:t>April 21, 2015</a:t>
+            </a:r>
+            <a:endParaRPr lang="en-US" dirty="0" smtClean="0"/>
+          </a:p>
+          <a:p>
+            <a:endParaRPr lang="en-US" dirty="0" smtClean="0"/>
           </a:p>
         </p:txBody>
       </p:sp>
     </p:spTree>
     <p:extLst>
       <p:ext uri="{BB962C8B-B14F-4D97-AF65-F5344CB8AC3E}">
-        <p14:creationId xmlns:p14="http://schemas.microsoft.com/office/powerpoint/2010/main" val="271919927"/>
+        <p14:creationId xmlns:p14="http://schemas.microsoft.com/office/powerpoint/2010/main" val="3277197351"/>
       </p:ext>
     </p:extLst>
   </p:cSld>
   <p:clrMapOvr>
     <a:masterClrMapping/>
   </p:clrMapOvr>
+  <p:timing>
+    <p:tnLst>
+      <p:par>
+        <p:cTn xmlns:p14="http://schemas.microsoft.com/office/powerpoint/2010/main" id="1" dur="indefinite" restart="never" nodeType="tmRoot"/>
+      </p:par>
+    </p:tnLst>
+  </p:timing>
 </p:sld>
 </file>
 
 <file path=ppt/slides/slide3.xml><?xml version="1.0" encoding="utf-8"?>
 <p:sld xmlns:a="http://schemas.openxmlformats.org/drawingml/2006/main" xmlns:r="http://schemas.openxmlformats.org/officeDocument/2006/relationships" xmlns:p="http://schemas.openxmlformats.org/presentationml/2006/main">
   <p:cSld>
+    <p:bg>
+      <p:bgPr>
+        <a:solidFill>
+          <a:srgbClr val="34ABFF"/>
+        </a:solidFill>
+        <a:effectLst/>
+      </p:bgPr>
+    </p:bg>
     <p:spTree>
       <p:nvGrpSpPr>
         <p:cNvPr id="1" name=""/>
@@ -3249,62 +4565,407 @@
           <a:chExt cx="0" cy="0"/>
         </a:xfrm>
       </p:grpSpPr>
-      <p:sp>
-        <p:nvSpPr>
-          <p:cNvPr id="2" name="Title 1"/>
-          <p:cNvSpPr>
-            <a:spLocks noGrp="1"/>
-          </p:cNvSpPr>
-          <p:nvPr>
-            <p:ph type="title"/>
-          </p:nvPr>
-        </p:nvSpPr>
-        <p:spPr/>
-        <p:txBody>
-          <a:bodyPr/>
-          <a:lstStyle/>
-          <a:p>
-            <a:r>
-              <a:rPr lang="en-US" dirty="0" smtClean="0"/>
-              <a:t>Background</a:t>
-            </a:r>
-            <a:endParaRPr lang="en-US" dirty="0"/>
-          </a:p>
-        </p:txBody>
-      </p:sp>
-      <p:sp>
-        <p:nvSpPr>
-          <p:cNvPr id="3" name="Content Placeholder 2"/>
-          <p:cNvSpPr>
-            <a:spLocks noGrp="1"/>
-          </p:cNvSpPr>
-          <p:nvPr>
-            <p:ph idx="1"/>
-          </p:nvPr>
-        </p:nvSpPr>
-        <p:spPr/>
-        <p:txBody>
-          <a:bodyPr/>
-          <a:lstStyle/>
-          <a:p>
-            <a:r>
-              <a:rPr lang="en-US" dirty="0" smtClean="0"/>
-              <a:t>Danielle</a:t>
-            </a:r>
-            <a:endParaRPr lang="en-US" dirty="0"/>
+      <p:pic>
+        <p:nvPicPr>
+          <p:cNvPr id="8" name="Picture 7" descr="cumulus-big2.png"/>
+          <p:cNvPicPr>
+            <a:picLocks noChangeAspect="1"/>
+          </p:cNvPicPr>
+          <p:nvPr/>
+        </p:nvPicPr>
+        <p:blipFill>
+          <a:blip r:embed="rId2">
+            <a:extLst>
+              <a:ext uri="{BEBA8EAE-BF5A-486C-A8C5-ECC9F3942E4B}">
+                <a14:imgProps xmlns:a14="http://schemas.microsoft.com/office/drawing/2010/main">
+                  <a14:imgLayer r:embed="rId3">
+                    <a14:imgEffect>
+                      <a14:backgroundRemoval t="2119" b="97034" l="1842" r="100000"/>
+                    </a14:imgEffect>
+                  </a14:imgLayer>
+                </a14:imgProps>
+              </a:ext>
+              <a:ext uri="{28A0092B-C50C-407E-A947-70E740481C1C}">
+                <a14:useLocalDpi xmlns:a14="http://schemas.microsoft.com/office/drawing/2010/main" val="0"/>
+              </a:ext>
+            </a:extLst>
+          </a:blip>
+          <a:stretch>
+            <a:fillRect/>
+          </a:stretch>
+        </p:blipFill>
+        <p:spPr>
+          <a:xfrm>
+            <a:off x="1818433" y="2503885"/>
+            <a:ext cx="2716511" cy="1687096"/>
+          </a:xfrm>
+          <a:prstGeom prst="rect">
+            <a:avLst/>
+          </a:prstGeom>
+        </p:spPr>
+      </p:pic>
+      <p:pic>
+        <p:nvPicPr>
+          <p:cNvPr id="6" name="Picture 5" descr="cumulus-big1.png"/>
+          <p:cNvPicPr>
+            <a:picLocks noChangeAspect="1"/>
+          </p:cNvPicPr>
+          <p:nvPr/>
+        </p:nvPicPr>
+        <p:blipFill>
+          <a:blip r:embed="rId4">
+            <a:extLst>
+              <a:ext uri="{BEBA8EAE-BF5A-486C-A8C5-ECC9F3942E4B}">
+                <a14:imgProps xmlns:a14="http://schemas.microsoft.com/office/drawing/2010/main">
+                  <a14:imgLayer r:embed="rId5">
+                    <a14:imgEffect>
+                      <a14:backgroundRemoval t="2548" b="98408" l="3161" r="97989"/>
+                    </a14:imgEffect>
+                  </a14:imgLayer>
+                </a14:imgProps>
+              </a:ext>
+              <a:ext uri="{28A0092B-C50C-407E-A947-70E740481C1C}">
+                <a14:useLocalDpi xmlns:a14="http://schemas.microsoft.com/office/drawing/2010/main" val="0"/>
+              </a:ext>
+            </a:extLst>
+          </a:blip>
+          <a:stretch>
+            <a:fillRect/>
+          </a:stretch>
+        </p:blipFill>
+        <p:spPr>
+          <a:xfrm>
+            <a:off x="1077304" y="2565510"/>
+            <a:ext cx="3215080" cy="2900963"/>
+          </a:xfrm>
+          <a:prstGeom prst="rect">
+            <a:avLst/>
+          </a:prstGeom>
+        </p:spPr>
+      </p:pic>
+      <p:pic>
+        <p:nvPicPr>
+          <p:cNvPr id="5" name="Picture 4" descr="cumulus-big3.png"/>
+          <p:cNvPicPr>
+            <a:picLocks noChangeAspect="1"/>
+          </p:cNvPicPr>
+          <p:nvPr/>
+        </p:nvPicPr>
+        <p:blipFill rotWithShape="1">
+          <a:blip r:embed="rId6">
+            <a:extLst>
+              <a:ext uri="{BEBA8EAE-BF5A-486C-A8C5-ECC9F3942E4B}">
+                <a14:imgProps xmlns:a14="http://schemas.microsoft.com/office/drawing/2010/main">
+                  <a14:imgLayer r:embed="rId7">
+                    <a14:imgEffect>
+                      <a14:backgroundRemoval t="391" b="99219" l="1496" r="98291"/>
+                    </a14:imgEffect>
+                  </a14:imgLayer>
+                </a14:imgProps>
+              </a:ext>
+              <a:ext uri="{28A0092B-C50C-407E-A947-70E740481C1C}">
+                <a14:useLocalDpi xmlns:a14="http://schemas.microsoft.com/office/drawing/2010/main" val="0"/>
+              </a:ext>
+            </a:extLst>
+          </a:blip>
+          <a:srcRect r="28043"/>
+          <a:stretch/>
+        </p:blipFill>
+        <p:spPr>
+          <a:xfrm>
+            <a:off x="6376119" y="849609"/>
+            <a:ext cx="2767881" cy="2104111"/>
+          </a:xfrm>
+          <a:prstGeom prst="rect">
+            <a:avLst/>
+          </a:prstGeom>
+        </p:spPr>
+      </p:pic>
+      <p:pic>
+        <p:nvPicPr>
+          <p:cNvPr id="10" name="Picture 9" descr="cumulus-huge.png"/>
+          <p:cNvPicPr>
+            <a:picLocks noChangeAspect="1"/>
+          </p:cNvPicPr>
+          <p:nvPr/>
+        </p:nvPicPr>
+        <p:blipFill rotWithShape="1">
+          <a:blip r:embed="rId8">
+            <a:extLst>
+              <a:ext uri="{BEBA8EAE-BF5A-486C-A8C5-ECC9F3942E4B}">
+                <a14:imgProps xmlns:a14="http://schemas.microsoft.com/office/drawing/2010/main">
+                  <a14:imgLayer r:embed="rId9">
+                    <a14:imgEffect>
+                      <a14:backgroundRemoval t="237" b="99526" l="684" r="99902"/>
+                    </a14:imgEffect>
+                  </a14:imgLayer>
+                </a14:imgProps>
+              </a:ext>
+              <a:ext uri="{28A0092B-C50C-407E-A947-70E740481C1C}">
+                <a14:useLocalDpi xmlns:a14="http://schemas.microsoft.com/office/drawing/2010/main" val="0"/>
+              </a:ext>
+            </a:extLst>
+          </a:blip>
+          <a:srcRect l="25479" t="29035"/>
+          <a:stretch/>
+        </p:blipFill>
+        <p:spPr>
+          <a:xfrm>
+            <a:off x="0" y="-1"/>
+            <a:ext cx="4845674" cy="1901665"/>
+          </a:xfrm>
+          <a:prstGeom prst="rect">
+            <a:avLst/>
+          </a:prstGeom>
+        </p:spPr>
+      </p:pic>
+      <p:pic>
+        <p:nvPicPr>
+          <p:cNvPr id="11" name="Picture 10" descr="cumulus-small1.png"/>
+          <p:cNvPicPr>
+            <a:picLocks noChangeAspect="1"/>
+          </p:cNvPicPr>
+          <p:nvPr/>
+        </p:nvPicPr>
+        <p:blipFill>
+          <a:blip r:embed="rId10">
+            <a:extLst>
+              <a:ext uri="{BEBA8EAE-BF5A-486C-A8C5-ECC9F3942E4B}">
+                <a14:imgProps xmlns:a14="http://schemas.microsoft.com/office/drawing/2010/main">
+                  <a14:imgLayer r:embed="rId11">
+                    <a14:imgEffect>
+                      <a14:backgroundRemoval t="1163" b="100000" l="1852" r="100000"/>
+                    </a14:imgEffect>
+                  </a14:imgLayer>
+                </a14:imgProps>
+              </a:ext>
+              <a:ext uri="{28A0092B-C50C-407E-A947-70E740481C1C}">
+                <a14:useLocalDpi xmlns:a14="http://schemas.microsoft.com/office/drawing/2010/main" val="0"/>
+              </a:ext>
+            </a:extLst>
+          </a:blip>
+          <a:stretch>
+            <a:fillRect/>
+          </a:stretch>
+        </p:blipFill>
+        <p:spPr>
+          <a:xfrm>
+            <a:off x="7180064" y="2982757"/>
+            <a:ext cx="1107131" cy="881604"/>
+          </a:xfrm>
+          <a:prstGeom prst="rect">
+            <a:avLst/>
+          </a:prstGeom>
+        </p:spPr>
+      </p:pic>
+      <p:pic>
+        <p:nvPicPr>
+          <p:cNvPr id="13" name="Picture 12" descr="cumulus-small3.png"/>
+          <p:cNvPicPr>
+            <a:picLocks noChangeAspect="1"/>
+          </p:cNvPicPr>
+          <p:nvPr/>
+        </p:nvPicPr>
+        <p:blipFill>
+          <a:blip r:embed="rId12">
+            <a:extLst>
+              <a:ext uri="{BEBA8EAE-BF5A-486C-A8C5-ECC9F3942E4B}">
+                <a14:imgProps xmlns:a14="http://schemas.microsoft.com/office/drawing/2010/main">
+                  <a14:imgLayer r:embed="rId13">
+                    <a14:imgEffect>
+                      <a14:backgroundRemoval t="0" b="100000" l="0" r="100000"/>
+                    </a14:imgEffect>
+                  </a14:imgLayer>
+                </a14:imgProps>
+              </a:ext>
+              <a:ext uri="{28A0092B-C50C-407E-A947-70E740481C1C}">
+                <a14:useLocalDpi xmlns:a14="http://schemas.microsoft.com/office/drawing/2010/main" val="0"/>
+              </a:ext>
+            </a:extLst>
+          </a:blip>
+          <a:stretch>
+            <a:fillRect/>
+          </a:stretch>
+        </p:blipFill>
+        <p:spPr>
+          <a:xfrm>
+            <a:off x="7180064" y="4892543"/>
+            <a:ext cx="1515781" cy="971047"/>
+          </a:xfrm>
+          <a:prstGeom prst="rect">
+            <a:avLst/>
+          </a:prstGeom>
+        </p:spPr>
+      </p:pic>
+      <p:pic>
+        <p:nvPicPr>
+          <p:cNvPr id="12" name="Picture 11" descr="cumulus-small2.png"/>
+          <p:cNvPicPr>
+            <a:picLocks noChangeAspect="1"/>
+          </p:cNvPicPr>
+          <p:nvPr/>
+        </p:nvPicPr>
+        <p:blipFill>
+          <a:blip r:embed="rId14">
+            <a:extLst>
+              <a:ext uri="{BEBA8EAE-BF5A-486C-A8C5-ECC9F3942E4B}">
+                <a14:imgProps xmlns:a14="http://schemas.microsoft.com/office/drawing/2010/main">
+                  <a14:imgLayer r:embed="rId15">
+                    <a14:imgEffect>
+                      <a14:backgroundRemoval t="0" b="89216" l="1316" r="89474"/>
+                    </a14:imgEffect>
+                  </a14:imgLayer>
+                </a14:imgProps>
+              </a:ext>
+              <a:ext uri="{28A0092B-C50C-407E-A947-70E740481C1C}">
+                <a14:useLocalDpi xmlns:a14="http://schemas.microsoft.com/office/drawing/2010/main" val="0"/>
+              </a:ext>
+            </a:extLst>
+          </a:blip>
+          <a:stretch>
+            <a:fillRect/>
+          </a:stretch>
+        </p:blipFill>
+        <p:spPr>
+          <a:xfrm>
+            <a:off x="6783152" y="5063211"/>
+            <a:ext cx="1714339" cy="1150412"/>
+          </a:xfrm>
+          <a:prstGeom prst="rect">
+            <a:avLst/>
+          </a:prstGeom>
+        </p:spPr>
+      </p:pic>
+      <p:pic>
+        <p:nvPicPr>
+          <p:cNvPr id="14" name="Picture 13" descr="cumulus-tiny.png"/>
+          <p:cNvPicPr>
+            <a:picLocks noChangeAspect="1"/>
+          </p:cNvPicPr>
+          <p:nvPr/>
+        </p:nvPicPr>
+        <p:blipFill rotWithShape="1">
+          <a:blip r:embed="rId16">
+            <a:extLst>
+              <a:ext uri="{BEBA8EAE-BF5A-486C-A8C5-ECC9F3942E4B}">
+                <a14:imgProps xmlns:a14="http://schemas.microsoft.com/office/drawing/2010/main">
+                  <a14:imgLayer r:embed="rId17">
+                    <a14:imgEffect>
+                      <a14:backgroundRemoval t="1758" b="17188" l="10000" r="96250"/>
+                    </a14:imgEffect>
+                  </a14:imgLayer>
+                </a14:imgProps>
+              </a:ext>
+              <a:ext uri="{28A0092B-C50C-407E-A947-70E740481C1C}">
+                <a14:useLocalDpi xmlns:a14="http://schemas.microsoft.com/office/drawing/2010/main" val="0"/>
+              </a:ext>
+            </a:extLst>
+          </a:blip>
+          <a:srcRect b="80697"/>
+          <a:stretch/>
+        </p:blipFill>
+        <p:spPr>
+          <a:xfrm>
+            <a:off x="3399404" y="5705142"/>
+            <a:ext cx="2469517" cy="1016961"/>
+          </a:xfrm>
+          <a:prstGeom prst="rect">
+            <a:avLst/>
+          </a:prstGeom>
+        </p:spPr>
+      </p:pic>
+      <p:pic>
+        <p:nvPicPr>
+          <p:cNvPr id="15" name="Picture 14" descr="cumulus-tiny.png"/>
+          <p:cNvPicPr>
+            <a:picLocks noChangeAspect="1"/>
+          </p:cNvPicPr>
+          <p:nvPr/>
+        </p:nvPicPr>
+        <p:blipFill rotWithShape="1">
+          <a:blip r:embed="rId18">
+            <a:extLst>
+              <a:ext uri="{BEBA8EAE-BF5A-486C-A8C5-ECC9F3942E4B}">
+                <a14:imgProps xmlns:a14="http://schemas.microsoft.com/office/drawing/2010/main">
+                  <a14:imgLayer r:embed="rId19">
+                    <a14:imgEffect>
+                      <a14:backgroundRemoval t="30078" b="43750" l="0" r="94167"/>
+                    </a14:imgEffect>
+                  </a14:imgLayer>
+                </a14:imgProps>
+              </a:ext>
+              <a:ext uri="{28A0092B-C50C-407E-A947-70E740481C1C}">
+                <a14:useLocalDpi xmlns:a14="http://schemas.microsoft.com/office/drawing/2010/main" val="0"/>
+              </a:ext>
+            </a:extLst>
+          </a:blip>
+          <a:srcRect l="24738" t="29156" b="54319"/>
+          <a:stretch/>
+        </p:blipFill>
+        <p:spPr>
+          <a:xfrm>
+            <a:off x="0" y="5063211"/>
+            <a:ext cx="2427147" cy="1136861"/>
+          </a:xfrm>
+          <a:prstGeom prst="rect">
+            <a:avLst/>
+          </a:prstGeom>
+        </p:spPr>
+      </p:pic>
+      <p:sp>
+        <p:nvSpPr>
+          <p:cNvPr id="17" name="TextBox 16"/>
+          <p:cNvSpPr txBox="1"/>
+          <p:nvPr/>
+        </p:nvSpPr>
+        <p:spPr>
+          <a:xfrm>
+            <a:off x="930372" y="2155932"/>
+            <a:ext cx="7209144" cy="1400383"/>
+          </a:xfrm>
+          <a:prstGeom prst="rect">
+            <a:avLst/>
+          </a:prstGeom>
+          <a:noFill/>
+        </p:spPr>
+        <p:txBody>
+          <a:bodyPr wrap="square" rtlCol="0">
+            <a:spAutoFit/>
+          </a:bodyPr>
+          <a:lstStyle/>
+          <a:p>
+            <a:pPr algn="ctr"/>
+            <a:r>
+              <a:rPr lang="en-US" sz="8500" dirty="0" smtClean="0">
+                <a:latin typeface="Unlock Regular"/>
+                <a:cs typeface="Unlock Regular"/>
+              </a:rPr>
+              <a:t>Switch It Up!</a:t>
+            </a:r>
+            <a:endParaRPr lang="en-US" sz="8500" dirty="0">
+              <a:latin typeface="Unlock Regular"/>
+              <a:cs typeface="Unlock Regular"/>
+            </a:endParaRPr>
           </a:p>
         </p:txBody>
       </p:sp>
     </p:spTree>
     <p:extLst>
       <p:ext uri="{BB962C8B-B14F-4D97-AF65-F5344CB8AC3E}">
-        <p14:creationId xmlns:p14="http://schemas.microsoft.com/office/powerpoint/2010/main" val="1729433384"/>
+        <p14:creationId xmlns:p14="http://schemas.microsoft.com/office/powerpoint/2010/main" val="3326709432"/>
       </p:ext>
     </p:extLst>
   </p:cSld>
   <p:clrMapOvr>
     <a:masterClrMapping/>
   </p:clrMapOvr>
+  <p:timing>
+    <p:tnLst>
+      <p:par>
+        <p:cTn xmlns:p14="http://schemas.microsoft.com/office/powerpoint/2010/main" id="1" dur="indefinite" restart="never" nodeType="tmRoot"/>
+      </p:par>
+    </p:tnLst>
+  </p:timing>
 </p:sld>
 </file>
 
@@ -3342,7 +5003,7 @@
           <a:p>
             <a:r>
               <a:rPr lang="en-US" dirty="0" smtClean="0"/>
-              <a:t>Criteria/Constraints</a:t>
+              <a:t>Introduction</a:t>
             </a:r>
             <a:endParaRPr lang="en-US" dirty="0"/>
           </a:p>
@@ -3365,7 +5026,19 @@
           <a:p>
             <a:r>
               <a:rPr lang="en-US" dirty="0" smtClean="0"/>
-              <a:t>David presents</a:t>
+              <a:t>Design and development</a:t>
+            </a:r>
+          </a:p>
+          <a:p>
+            <a:r>
+              <a:rPr lang="en-US" dirty="0" smtClean="0"/>
+              <a:t>Gameplay</a:t>
+            </a:r>
+          </a:p>
+          <a:p>
+            <a:r>
+              <a:rPr lang="en-US" dirty="0" smtClean="0"/>
+              <a:t>Results</a:t>
             </a:r>
             <a:endParaRPr lang="en-US" dirty="0"/>
           </a:p>
@@ -3374,13 +5047,20 @@
     </p:spTree>
     <p:extLst>
       <p:ext uri="{BB962C8B-B14F-4D97-AF65-F5344CB8AC3E}">
-        <p14:creationId xmlns:p14="http://schemas.microsoft.com/office/powerpoint/2010/main" val="358899310"/>
+        <p14:creationId xmlns:p14="http://schemas.microsoft.com/office/powerpoint/2010/main" val="3638495129"/>
       </p:ext>
     </p:extLst>
   </p:cSld>
   <p:clrMapOvr>
     <a:masterClrMapping/>
   </p:clrMapOvr>
+  <p:timing>
+    <p:tnLst>
+      <p:par>
+        <p:cTn xmlns:p14="http://schemas.microsoft.com/office/powerpoint/2010/main" id="1" dur="indefinite" restart="never" nodeType="tmRoot"/>
+      </p:par>
+    </p:tnLst>
+  </p:timing>
 </p:sld>
 </file>
 
@@ -3418,7 +5098,7 @@
           <a:p>
             <a:r>
               <a:rPr lang="en-US" dirty="0" smtClean="0"/>
-              <a:t>Game Description</a:t>
+              <a:t>Autism Spectrum Disorder</a:t>
             </a:r>
             <a:endParaRPr lang="en-US" dirty="0"/>
           </a:p>
@@ -3434,29 +5114,69 @@
             <p:ph idx="1"/>
           </p:nvPr>
         </p:nvSpPr>
-        <p:spPr/>
+        <p:spPr>
+          <a:xfrm>
+            <a:off x="457200" y="1562852"/>
+            <a:ext cx="8229600" cy="4525963"/>
+          </a:xfrm>
+        </p:spPr>
         <p:txBody>
           <a:bodyPr/>
           <a:lstStyle/>
           <a:p>
             <a:r>
               <a:rPr lang="en-US" dirty="0" smtClean="0"/>
-              <a:t>David</a:t>
-            </a:r>
-            <a:endParaRPr lang="en-US" dirty="0"/>
+              <a:t>Social </a:t>
+            </a:r>
+            <a:r>
+              <a:rPr lang="en-US" dirty="0" smtClean="0"/>
+              <a:t>withdrawal</a:t>
+            </a:r>
+          </a:p>
+          <a:p>
+            <a:r>
+              <a:rPr lang="en-US" dirty="0" smtClean="0"/>
+              <a:t>Trouble managing </a:t>
+            </a:r>
+            <a:r>
+              <a:rPr lang="en-US" dirty="0" smtClean="0"/>
+              <a:t>emotions</a:t>
+            </a:r>
+          </a:p>
+          <a:p>
+            <a:r>
+              <a:rPr lang="en-US" dirty="0" smtClean="0"/>
+              <a:t>Upset </a:t>
+            </a:r>
+            <a:r>
+              <a:rPr lang="en-US" dirty="0" smtClean="0"/>
+              <a:t>by changes in </a:t>
+            </a:r>
+            <a:r>
+              <a:rPr lang="en-US" dirty="0" smtClean="0"/>
+              <a:t>routine</a:t>
+            </a:r>
+            <a:endParaRPr lang="en-US" dirty="0" smtClean="0"/>
           </a:p>
         </p:txBody>
       </p:sp>
     </p:spTree>
     <p:extLst>
       <p:ext uri="{BB962C8B-B14F-4D97-AF65-F5344CB8AC3E}">
-        <p14:creationId xmlns:p14="http://schemas.microsoft.com/office/powerpoint/2010/main" val="1580453675"/>
+        <p14:creationId xmlns:p14="http://schemas.microsoft.com/office/powerpoint/2010/main" val="3818166681"/>
       </p:ext>
     </p:extLst>
   </p:cSld>
   <p:clrMapOvr>
     <a:masterClrMapping/>
   </p:clrMapOvr>
+  <p:timing>
+    <p:tnLst>
+      <p:par>
+        <p:cTn xmlns:p14="http://schemas.microsoft.com/office/powerpoint/2010/main" id="1" dur="indefinite" restart="never" nodeType="tmRoot"/>
+      </p:par>
+    </p:tnLst>
+  </p:timing>
 </p:sld>
 </file>
 
@@ -3494,7 +5214,7 @@
           <a:p>
             <a:r>
               <a:rPr lang="en-US" dirty="0" smtClean="0"/>
-              <a:t>Development Process</a:t>
+              <a:t>Treatment</a:t>
             </a:r>
             <a:endParaRPr lang="en-US" dirty="0"/>
           </a:p>
@@ -3517,7 +5237,13 @@
           <a:p>
             <a:r>
               <a:rPr lang="en-US" dirty="0" smtClean="0"/>
-              <a:t>Tyler</a:t>
+              <a:t>Minimize maladaptive behaviors</a:t>
+            </a:r>
+          </a:p>
+          <a:p>
+            <a:r>
+              <a:rPr lang="en-US" dirty="0" smtClean="0"/>
+              <a:t>Operant conditioning</a:t>
             </a:r>
             <a:endParaRPr lang="en-US" dirty="0"/>
           </a:p>
@@ -3526,13 +5252,20 @@
     </p:spTree>
     <p:extLst>
       <p:ext uri="{BB962C8B-B14F-4D97-AF65-F5344CB8AC3E}">
-        <p14:creationId xmlns:p14="http://schemas.microsoft.com/office/powerpoint/2010/main" val="4142557275"/>
+        <p14:creationId xmlns:p14="http://schemas.microsoft.com/office/powerpoint/2010/main" val="882514396"/>
       </p:ext>
     </p:extLst>
   </p:cSld>
   <p:clrMapOvr>
     <a:masterClrMapping/>
   </p:clrMapOvr>
+  <p:timing>
+    <p:tnLst>
+      <p:par>
+        <p:cTn xmlns:p14="http://schemas.microsoft.com/office/powerpoint/2010/main" id="1" dur="indefinite" restart="never" nodeType="tmRoot"/>
+      </p:par>
+    </p:tnLst>
+  </p:timing>
 </p:sld>
 </file>
 
@@ -3555,7 +5288,7 @@
       </p:grpSpPr>
       <p:sp>
         <p:nvSpPr>
-          <p:cNvPr id="2" name="Title 1"/>
+          <p:cNvPr id="4" name="Title 3"/>
           <p:cNvSpPr>
             <a:spLocks noGrp="1"/>
           </p:cNvSpPr>
@@ -3570,31 +5303,125 @@
           <a:p>
             <a:r>
               <a:rPr lang="en-US" dirty="0" smtClean="0"/>
-              <a:t>Conclusion</a:t>
+              <a:t>Criteria and Constraints</a:t>
             </a:r>
             <a:endParaRPr lang="en-US" dirty="0"/>
           </a:p>
         </p:txBody>
       </p:sp>
-      <p:sp>
-        <p:nvSpPr>
-          <p:cNvPr id="3" name="Content Placeholder 2"/>
-          <p:cNvSpPr>
-            <a:spLocks noGrp="1"/>
-          </p:cNvSpPr>
+      <p:pic>
+        <p:nvPicPr>
+          <p:cNvPr id="6" name="Content Placeholder 5"/>
+          <p:cNvPicPr>
+            <a:picLocks noGrp="1" noChangeAspect="1"/>
+          </p:cNvPicPr>
           <p:nvPr>
             <p:ph idx="1"/>
           </p:nvPr>
-        </p:nvSpPr>
-        <p:spPr/>
-        <p:txBody>
-          <a:bodyPr/>
-          <a:lstStyle/>
-          <a:p>
-            <a:r>
-              <a:rPr lang="en-US" dirty="0" smtClean="0"/>
-              <a:t>Claire</a:t>
-            </a:r>
+        </p:nvPicPr>
+        <p:blipFill>
+          <a:blip r:embed="rId2">
+            <a:extLst>
+              <a:ext uri="{28A0092B-C50C-407E-A947-70E740481C1C}">
+                <a14:useLocalDpi xmlns:a14="http://schemas.microsoft.com/office/drawing/2010/main" val="0"/>
+              </a:ext>
+            </a:extLst>
+          </a:blip>
+          <a:stretch>
+            <a:fillRect/>
+          </a:stretch>
+        </p:blipFill>
+        <p:spPr>
+          <a:xfrm>
+            <a:off x="381001" y="3810000"/>
+            <a:ext cx="4581292" cy="1295400"/>
+          </a:xfrm>
+        </p:spPr>
+      </p:pic>
+      <p:pic>
+        <p:nvPicPr>
+          <p:cNvPr id="7" name="Picture 6"/>
+          <p:cNvPicPr>
+            <a:picLocks noChangeAspect="1"/>
+          </p:cNvPicPr>
+          <p:nvPr/>
+        </p:nvPicPr>
+        <p:blipFill>
+          <a:blip r:embed="rId3">
+            <a:extLst>
+              <a:ext uri="{28A0092B-C50C-407E-A947-70E740481C1C}">
+                <a14:useLocalDpi xmlns:a14="http://schemas.microsoft.com/office/drawing/2010/main" val="0"/>
+              </a:ext>
+            </a:extLst>
+          </a:blip>
+          <a:stretch>
+            <a:fillRect/>
+          </a:stretch>
+        </p:blipFill>
+        <p:spPr>
+          <a:xfrm>
+            <a:off x="6172200" y="3581400"/>
+            <a:ext cx="1905000" cy="1905000"/>
+          </a:xfrm>
+          <a:prstGeom prst="rect">
+            <a:avLst/>
+          </a:prstGeom>
+        </p:spPr>
+      </p:pic>
+      <p:sp>
+        <p:nvSpPr>
+          <p:cNvPr id="8" name="TextBox 7"/>
+          <p:cNvSpPr txBox="1"/>
+          <p:nvPr/>
+        </p:nvSpPr>
+        <p:spPr>
+          <a:xfrm>
+            <a:off x="1066800" y="1752598"/>
+            <a:ext cx="6629400" cy="1477328"/>
+          </a:xfrm>
+          <a:prstGeom prst="rect">
+            <a:avLst/>
+          </a:prstGeom>
+          <a:noFill/>
+        </p:spPr>
+        <p:txBody>
+          <a:bodyPr wrap="square" rtlCol="0">
+            <a:spAutoFit/>
+          </a:bodyPr>
+          <a:lstStyle/>
+          <a:p>
+            <a:pPr marL="285750" indent="-285750">
+              <a:buFont typeface="Arial" pitchFamily="34" charset="0"/>
+              <a:buChar char="•"/>
+            </a:pPr>
+            <a:r>
+              <a:rPr lang="en-US" sz="2400" dirty="0" smtClean="0"/>
+              <a:t>Autism Spectrum Disorder</a:t>
+            </a:r>
+          </a:p>
+          <a:p>
+            <a:pPr marL="285750" indent="-285750">
+              <a:buFont typeface="Arial" pitchFamily="34" charset="0"/>
+              <a:buChar char="•"/>
+            </a:pPr>
+            <a:r>
+              <a:rPr lang="en-US" sz="2400" dirty="0" err="1" smtClean="0"/>
+              <a:t>Timebox</a:t>
+            </a:r>
+            <a:endParaRPr lang="en-US" sz="2400" dirty="0" smtClean="0"/>
+          </a:p>
+          <a:p>
+            <a:pPr marL="285750" indent="-285750">
+              <a:buFont typeface="Arial" pitchFamily="34" charset="0"/>
+              <a:buChar char="•"/>
+            </a:pPr>
+            <a:endParaRPr lang="en-US" sz="2400" dirty="0" smtClean="0"/>
+          </a:p>
+          <a:p>
+            <a:pPr marL="285750" indent="-285750">
+              <a:buFont typeface="Arial" pitchFamily="34" charset="0"/>
+              <a:buChar char="•"/>
+            </a:pPr>
             <a:endParaRPr lang="en-US" dirty="0"/>
           </a:p>
         </p:txBody>
@@ -3602,7 +5429,177 @@
     </p:spTree>
     <p:extLst>
       <p:ext uri="{BB962C8B-B14F-4D97-AF65-F5344CB8AC3E}">
-        <p14:creationId xmlns:p14="http://schemas.microsoft.com/office/powerpoint/2010/main" val="748896215"/>
+        <p14:creationId xmlns:p14="http://schemas.microsoft.com/office/powerpoint/2010/main" val="2304238729"/>
+      </p:ext>
+    </p:extLst>
+  </p:cSld>
+  <p:clrMapOvr>
+    <a:masterClrMapping/>
+  </p:clrMapOvr>
+  <p:timing>
+    <p:tnLst>
+      <p:par>
+        <p:cTn xmlns:p14="http://schemas.microsoft.com/office/powerpoint/2010/main" id="1" dur="indefinite" restart="never" nodeType="tmRoot"/>
+      </p:par>
+    </p:tnLst>
+  </p:timing>
+</p:sld>
+</file>
+
+<file path=ppt/slides/slide8.xml><?xml version="1.0" encoding="utf-8"?>
+<p:sld xmlns:a="http://schemas.openxmlformats.org/drawingml/2006/main" xmlns:r="http://schemas.openxmlformats.org/officeDocument/2006/relationships" xmlns:p="http://schemas.openxmlformats.org/presentationml/2006/main">
+  <p:cSld>
+    <p:bg>
+      <p:bgPr>
+        <a:solidFill>
+          <a:schemeClr val="tx1"/>
+        </a:solidFill>
+        <a:effectLst/>
+      </p:bgPr>
+    </p:bg>
+    <p:spTree>
+      <p:nvGrpSpPr>
+        <p:cNvPr id="1" name=""/>
+        <p:cNvGrpSpPr/>
+        <p:nvPr/>
+      </p:nvGrpSpPr>
+      <p:grpSpPr>
+        <a:xfrm>
+          <a:off x="0" y="0"/>
+          <a:ext cx="0" cy="0"/>
+          <a:chOff x="0" y="0"/>
+          <a:chExt cx="0" cy="0"/>
+        </a:xfrm>
+      </p:grpSpPr>
+      <p:pic>
+        <p:nvPicPr>
+          <p:cNvPr id="1026" name="Picture 2" descr="C:\Users\Nu11\Documents\ShareX\Screenshots\2015-04\Level_1_2015-04-13_17-32-02.png"/>
+          <p:cNvPicPr>
+            <a:picLocks noChangeAspect="1" noChangeArrowheads="1"/>
+          </p:cNvPicPr>
+          <p:nvPr/>
+        </p:nvPicPr>
+        <p:blipFill rotWithShape="1">
+          <a:blip r:embed="rId2">
+            <a:extLst>
+              <a:ext uri="{28A0092B-C50C-407E-A947-70E740481C1C}">
+                <a14:useLocalDpi xmlns:a14="http://schemas.microsoft.com/office/drawing/2010/main" val="0"/>
+              </a:ext>
+            </a:extLst>
+          </a:blip>
+          <a:srcRect l="2988" t="7516" r="3044" b="3098"/>
+          <a:stretch/>
+        </p:blipFill>
+        <p:spPr bwMode="auto">
+          <a:xfrm>
+            <a:off x="317500" y="0"/>
+            <a:ext cx="8524875" cy="6855555"/>
+          </a:xfrm>
+          <a:prstGeom prst="rect">
+            <a:avLst/>
+          </a:prstGeom>
+          <a:noFill/>
+          <a:extLst>
+            <a:ext uri="{909E8E84-426E-40dd-AFC4-6F175D3DCCD1}">
+              <a14:hiddenFill xmlns:a14="http://schemas.microsoft.com/office/drawing/2010/main">
+                <a:solidFill>
+                  <a:srgbClr val="FFFFFF"/>
+                </a:solidFill>
+              </a14:hiddenFill>
+            </a:ext>
+          </a:extLst>
+        </p:spPr>
+      </p:pic>
+    </p:spTree>
+    <p:extLst>
+      <p:ext uri="{BB962C8B-B14F-4D97-AF65-F5344CB8AC3E}">
+        <p14:creationId xmlns:p14="http://schemas.microsoft.com/office/powerpoint/2010/main" val="4158136532"/>
+      </p:ext>
+    </p:extLst>
+  </p:cSld>
+  <p:clrMapOvr>
+    <a:masterClrMapping/>
+  </p:clrMapOvr>
+  <p:timing>
+    <p:tnLst>
+      <p:par>
+        <p:cTn xmlns:p14="http://schemas.microsoft.com/office/powerpoint/2010/main" id="1" dur="indefinite" restart="never" nodeType="tmRoot"/>
+      </p:par>
+    </p:tnLst>
+  </p:timing>
+</p:sld>
+</file>
+
+<file path=ppt/slides/slide9.xml><?xml version="1.0" encoding="utf-8"?>
+<p:sld xmlns:a="http://schemas.openxmlformats.org/drawingml/2006/main" xmlns:r="http://schemas.openxmlformats.org/officeDocument/2006/relationships" xmlns:p="http://schemas.openxmlformats.org/presentationml/2006/main">
+  <p:cSld>
+    <p:spTree>
+      <p:nvGrpSpPr>
+        <p:cNvPr id="1" name=""/>
+        <p:cNvGrpSpPr/>
+        <p:nvPr/>
+      </p:nvGrpSpPr>
+      <p:grpSpPr>
+        <a:xfrm>
+          <a:off x="0" y="0"/>
+          <a:ext cx="0" cy="0"/>
+          <a:chOff x="0" y="0"/>
+          <a:chExt cx="0" cy="0"/>
+        </a:xfrm>
+      </p:grpSpPr>
+      <p:pic>
+        <p:nvPicPr>
+          <p:cNvPr id="4" name="image07.jpg" descr="keyboardoutline.jpg"/>
+          <p:cNvPicPr/>
+          <p:nvPr/>
+        </p:nvPicPr>
+        <p:blipFill>
+          <a:blip r:embed="rId2">
+            <a:extLst>
+              <a:ext uri="{28A0092B-C50C-407E-A947-70E740481C1C}">
+                <a14:useLocalDpi xmlns:a14="http://schemas.microsoft.com/office/drawing/2010/main" val="0"/>
+              </a:ext>
+            </a:extLst>
+          </a:blip>
+          <a:srcRect/>
+          <a:stretch>
+            <a:fillRect/>
+          </a:stretch>
+        </p:blipFill>
+        <p:spPr>
+          <a:xfrm>
+            <a:off x="1008789" y="1846499"/>
+            <a:ext cx="7213436" cy="3412449"/>
+          </a:xfrm>
+          <a:prstGeom prst="rect">
+            <a:avLst/>
+          </a:prstGeom>
+          <a:ln/>
+        </p:spPr>
+      </p:pic>
+      <p:sp>
+        <p:nvSpPr>
+          <p:cNvPr id="5" name="Title 4"/>
+          <p:cNvSpPr>
+            <a:spLocks noGrp="1"/>
+          </p:cNvSpPr>
+          <p:nvPr>
+            <p:ph type="title"/>
+          </p:nvPr>
+        </p:nvSpPr>
+        <p:spPr/>
+        <p:txBody>
+          <a:bodyPr/>
+          <a:lstStyle/>
+          <a:p>
+            <a:endParaRPr lang="en-US"/>
+          </a:p>
+        </p:txBody>
+      </p:sp>
+    </p:spTree>
+    <p:extLst>
+      <p:ext uri="{BB962C8B-B14F-4D97-AF65-F5344CB8AC3E}">
+        <p14:creationId xmlns:p14="http://schemas.microsoft.com/office/powerpoint/2010/main" val="2008938861"/>
       </p:ext>
     </p:extLst>
   </p:cSld>

</xml_diff>